<commit_message>
the most recent presentation
</commit_message>
<xml_diff>
--- a/SeminarPresentation.pptx
+++ b/SeminarPresentation.pptx
@@ -5,10 +5,10 @@
     <p:sldMasterId id="2147483648" r:id="rId1"/>
   </p:sldMasterIdLst>
   <p:notesMasterIdLst>
-    <p:notesMasterId r:id="rId15"/>
+    <p:notesMasterId r:id="rId16"/>
   </p:notesMasterIdLst>
   <p:handoutMasterIdLst>
-    <p:handoutMasterId r:id="rId16"/>
+    <p:handoutMasterId r:id="rId17"/>
   </p:handoutMasterIdLst>
   <p:sldIdLst>
     <p:sldId id="261" r:id="rId2"/>
@@ -24,6 +24,7 @@
     <p:sldId id="269" r:id="rId12"/>
     <p:sldId id="270" r:id="rId13"/>
     <p:sldId id="272" r:id="rId14"/>
+    <p:sldId id="273" r:id="rId15"/>
   </p:sldIdLst>
   <p:sldSz cx="12192000" cy="6858000"/>
   <p:notesSz cx="6858000" cy="9144000"/>
@@ -2453,7 +2454,7 @@
           <a:p>
             <a:fld id="{59041DB8-B66F-4DC8-A96E-33677E0F90FF}" type="datetimeFigureOut">
               <a:rPr lang="en-US" smtClean="0"/>
-              <a:t>12/4/2017</a:t>
+              <a:t>12/5/2017</a:t>
             </a:fld>
             <a:endParaRPr lang="en-US" dirty="0"/>
           </a:p>
@@ -2618,7 +2619,7 @@
           <a:p>
             <a:fld id="{DEB49C4A-65AC-492D-9701-81B46C3AD0E4}" type="datetimeFigureOut">
               <a:rPr lang="en-US" smtClean="0"/>
-              <a:t>12/4/2017</a:t>
+              <a:t>12/5/2017</a:t>
             </a:fld>
             <a:endParaRPr lang="en-US" dirty="0"/>
           </a:p>
@@ -10947,44 +10948,852 @@
           </a:p>
         </p:txBody>
       </p:sp>
-      <p:sp>
-        <p:nvSpPr>
-          <p:cNvPr id="3" name="Content Placeholder 2">
-            <a:extLst>
-              <a:ext uri="{FF2B5EF4-FFF2-40B4-BE49-F238E27FC236}">
-                <a16:creationId xmlns:a16="http://schemas.microsoft.com/office/drawing/2014/main" id="{0D28A200-2292-42CC-BEF7-54AAB2961DE9}"/>
-              </a:ext>
-            </a:extLst>
-          </p:cNvPr>
-          <p:cNvSpPr>
-            <a:spLocks noGrp="1"/>
-          </p:cNvSpPr>
-          <p:nvPr>
-            <p:ph idx="1"/>
-          </p:nvPr>
-        </p:nvSpPr>
-        <p:spPr/>
-        <p:txBody>
-          <a:bodyPr/>
-          <a:lstStyle/>
-          <a:p>
-            <a:r>
-              <a:rPr lang="en-GB" dirty="0"/>
-              <a:t>Combining the metrices of the online retrieval algorithm and GSR</a:t>
-            </a:r>
-          </a:p>
-          <a:p>
-            <a:pPr lvl="1"/>
-            <a:r>
-              <a:rPr lang="en-GB" dirty="0"/>
-              <a:t>New post flood, news feed vary dramatically, adopt online retrieval, stable GSR</a:t>
-            </a:r>
-          </a:p>
-          <a:p>
-            <a:endParaRPr lang="en-GB" dirty="0"/>
-          </a:p>
-        </p:txBody>
-      </p:sp>
+      <mc:AlternateContent xmlns:mc="http://schemas.openxmlformats.org/markup-compatibility/2006">
+        <mc:Choice xmlns:a14="http://schemas.microsoft.com/office/drawing/2010/main" Requires="a14">
+          <p:sp>
+            <p:nvSpPr>
+              <p:cNvPr id="3" name="Content Placeholder 2">
+                <a:extLst>
+                  <a:ext uri="{FF2B5EF4-FFF2-40B4-BE49-F238E27FC236}">
+                    <a16:creationId xmlns:a16="http://schemas.microsoft.com/office/drawing/2014/main" id="{0D28A200-2292-42CC-BEF7-54AAB2961DE9}"/>
+                  </a:ext>
+                </a:extLst>
+              </p:cNvPr>
+              <p:cNvSpPr>
+                <a:spLocks noGrp="1"/>
+              </p:cNvSpPr>
+              <p:nvPr>
+                <p:ph idx="1"/>
+              </p:nvPr>
+            </p:nvSpPr>
+            <p:spPr/>
+            <p:txBody>
+              <a:bodyPr>
+                <a:normAutofit lnSpcReduction="10000"/>
+              </a:bodyPr>
+              <a:lstStyle/>
+              <a:p>
+                <a:r>
+                  <a:rPr lang="en-GB" dirty="0"/>
+                  <a:t>Combining the metrices of the online retrieval algorithm and GSR</a:t>
+                </a:r>
+              </a:p>
+              <a:p>
+                <a:pPr lvl="1"/>
+                <a:r>
+                  <a:rPr lang="en-GB" dirty="0"/>
+                  <a:t>New post flood, news feed vary dramatically, adopt online retrieval, stable GSR</a:t>
+                </a:r>
+              </a:p>
+              <a:p>
+                <a:r>
+                  <a:rPr lang="en-GB" dirty="0"/>
+                  <a:t>the weightage of topic w appears in a user v’s sliding window</a:t>
+                </a:r>
+              </a:p>
+              <a:p>
+                <a:pPr lvl="1"/>
+                <a14:m>
+                  <m:oMath xmlns:m="http://schemas.openxmlformats.org/officeDocument/2006/math">
+                    <m:r>
+                      <a:rPr lang="en-GB" b="0" i="1" smtClean="0">
+                        <a:latin typeface="Cambria Math" panose="02040503050406030204" pitchFamily="18" charset="0"/>
+                      </a:rPr>
+                      <m:t>𝑋</m:t>
+                    </m:r>
+                    <m:r>
+                      <a:rPr lang="en-GB" b="0" i="1" baseline="-25000" smtClean="0">
+                        <a:latin typeface="Cambria Math" panose="02040503050406030204" pitchFamily="18" charset="0"/>
+                      </a:rPr>
+                      <m:t>𝑤</m:t>
+                    </m:r>
+                    <m:r>
+                      <a:rPr lang="en-GB" b="0" i="1" baseline="-25000" smtClean="0">
+                        <a:latin typeface="Cambria Math" panose="02040503050406030204" pitchFamily="18" charset="0"/>
+                      </a:rPr>
+                      <m:t>,</m:t>
+                    </m:r>
+                    <m:r>
+                      <a:rPr lang="en-GB" b="0" i="1" baseline="-25000" smtClean="0">
+                        <a:latin typeface="Cambria Math" panose="02040503050406030204" pitchFamily="18" charset="0"/>
+                      </a:rPr>
+                      <m:t>𝑣</m:t>
+                    </m:r>
+                    <m:r>
+                      <a:rPr lang="en-GB" b="0" i="1" smtClean="0">
+                        <a:latin typeface="Cambria Math" panose="02040503050406030204" pitchFamily="18" charset="0"/>
+                      </a:rPr>
+                      <m:t>=</m:t>
+                    </m:r>
+                    <m:nary>
+                      <m:naryPr>
+                        <m:chr m:val="∑"/>
+                        <m:supHide m:val="on"/>
+                        <m:ctrlPr>
+                          <a:rPr lang="en-GB" i="1" smtClean="0">
+                            <a:latin typeface="Cambria Math" panose="02040503050406030204" pitchFamily="18" charset="0"/>
+                          </a:rPr>
+                        </m:ctrlPr>
+                      </m:naryPr>
+                      <m:sub>
+                        <m:r>
+                          <m:rPr>
+                            <m:brk m:alnAt="7"/>
+                          </m:rPr>
+                          <a:rPr lang="en-GB" b="0" i="1" smtClean="0">
+                            <a:latin typeface="Cambria Math" panose="02040503050406030204" pitchFamily="18" charset="0"/>
+                          </a:rPr>
+                          <m:t>𝑛</m:t>
+                        </m:r>
+                        <m:r>
+                          <a:rPr lang="en-GB" b="0" i="1" smtClean="0">
+                            <a:latin typeface="Cambria Math" panose="02040503050406030204" pitchFamily="18" charset="0"/>
+                            <a:ea typeface="Cambria Math" panose="02040503050406030204" pitchFamily="18" charset="0"/>
+                          </a:rPr>
+                          <m:t>∈</m:t>
+                        </m:r>
+                        <m:r>
+                          <a:rPr lang="en-GB" b="0" i="1" smtClean="0">
+                            <a:latin typeface="Cambria Math" panose="02040503050406030204" pitchFamily="18" charset="0"/>
+                            <a:ea typeface="Cambria Math" panose="02040503050406030204" pitchFamily="18" charset="0"/>
+                          </a:rPr>
+                          <m:t>𝑁</m:t>
+                        </m:r>
+                        <m:r>
+                          <a:rPr lang="en-GB" b="0" i="1" smtClean="0">
+                            <a:latin typeface="Cambria Math" panose="02040503050406030204" pitchFamily="18" charset="0"/>
+                            <a:ea typeface="Cambria Math" panose="02040503050406030204" pitchFamily="18" charset="0"/>
+                          </a:rPr>
+                          <m:t>(</m:t>
+                        </m:r>
+                        <m:r>
+                          <a:rPr lang="en-GB" b="0" i="1" smtClean="0">
+                            <a:latin typeface="Cambria Math" panose="02040503050406030204" pitchFamily="18" charset="0"/>
+                            <a:ea typeface="Cambria Math" panose="02040503050406030204" pitchFamily="18" charset="0"/>
+                          </a:rPr>
+                          <m:t>𝑣</m:t>
+                        </m:r>
+                        <m:r>
+                          <a:rPr lang="en-GB" b="0" i="1" smtClean="0">
+                            <a:latin typeface="Cambria Math" panose="02040503050406030204" pitchFamily="18" charset="0"/>
+                            <a:ea typeface="Cambria Math" panose="02040503050406030204" pitchFamily="18" charset="0"/>
+                          </a:rPr>
+                          <m:t>)</m:t>
+                        </m:r>
+                      </m:sub>
+                      <m:sup/>
+                      <m:e>
+                        <m:nary>
+                          <m:naryPr>
+                            <m:chr m:val="∑"/>
+                            <m:supHide m:val="on"/>
+                            <m:ctrlPr>
+                              <a:rPr lang="en-GB" i="1" smtClean="0">
+                                <a:latin typeface="Cambria Math" panose="02040503050406030204" pitchFamily="18" charset="0"/>
+                              </a:rPr>
+                            </m:ctrlPr>
+                          </m:naryPr>
+                          <m:sub>
+                            <m:r>
+                              <m:rPr>
+                                <m:brk m:alnAt="7"/>
+                              </m:rPr>
+                              <a:rPr lang="en-GB" b="0" i="1" smtClean="0">
+                                <a:latin typeface="Cambria Math" panose="02040503050406030204" pitchFamily="18" charset="0"/>
+                              </a:rPr>
+                              <m:t>1</m:t>
+                            </m:r>
+                            <m:r>
+                              <a:rPr lang="en-GB" b="0" i="1" smtClean="0">
+                                <a:latin typeface="Cambria Math" panose="02040503050406030204" pitchFamily="18" charset="0"/>
+                                <a:ea typeface="Cambria Math" panose="02040503050406030204" pitchFamily="18" charset="0"/>
+                              </a:rPr>
+                              <m:t>≤</m:t>
+                            </m:r>
+                            <m:r>
+                              <a:rPr lang="en-GB" b="0" i="1" smtClean="0">
+                                <a:latin typeface="Cambria Math" panose="02040503050406030204" pitchFamily="18" charset="0"/>
+                                <a:ea typeface="Cambria Math" panose="02040503050406030204" pitchFamily="18" charset="0"/>
+                              </a:rPr>
+                              <m:t>𝑖</m:t>
+                            </m:r>
+                            <m:r>
+                              <a:rPr lang="en-GB" b="0" i="1" smtClean="0">
+                                <a:latin typeface="Cambria Math" panose="02040503050406030204" pitchFamily="18" charset="0"/>
+                                <a:ea typeface="Cambria Math" panose="02040503050406030204" pitchFamily="18" charset="0"/>
+                              </a:rPr>
+                              <m:t>≤</m:t>
+                            </m:r>
+                            <m:r>
+                              <a:rPr lang="en-GB" b="0" i="1" smtClean="0">
+                                <a:latin typeface="Cambria Math" panose="02040503050406030204" pitchFamily="18" charset="0"/>
+                                <a:ea typeface="Cambria Math" panose="02040503050406030204" pitchFamily="18" charset="0"/>
+                              </a:rPr>
+                              <m:t>𝑀𝑣</m:t>
+                            </m:r>
+                            <m:r>
+                              <a:rPr lang="en-GB" b="0" i="1" baseline="-25000" smtClean="0">
+                                <a:latin typeface="Cambria Math" panose="02040503050406030204" pitchFamily="18" charset="0"/>
+                                <a:ea typeface="Cambria Math" panose="02040503050406030204" pitchFamily="18" charset="0"/>
+                              </a:rPr>
+                              <m:t>,</m:t>
+                            </m:r>
+                            <m:r>
+                              <a:rPr lang="en-GB" b="0" i="1" baseline="-25000" smtClean="0">
+                                <a:latin typeface="Cambria Math" panose="02040503050406030204" pitchFamily="18" charset="0"/>
+                                <a:ea typeface="Cambria Math" panose="02040503050406030204" pitchFamily="18" charset="0"/>
+                              </a:rPr>
+                              <m:t>𝑛</m:t>
+                            </m:r>
+                          </m:sub>
+                          <m:sup/>
+                          <m:e>
+                            <m:r>
+                              <a:rPr lang="en-GB" b="0" i="1" smtClean="0">
+                                <a:latin typeface="Cambria Math" panose="02040503050406030204" pitchFamily="18" charset="0"/>
+                              </a:rPr>
+                              <m:t>𝐷</m:t>
+                            </m:r>
+                            <m:r>
+                              <a:rPr lang="en-GB" b="0" i="1" baseline="-25000" smtClean="0">
+                                <a:latin typeface="Cambria Math" panose="02040503050406030204" pitchFamily="18" charset="0"/>
+                              </a:rPr>
+                              <m:t>𝑤</m:t>
+                            </m:r>
+                            <m:r>
+                              <a:rPr lang="en-GB" b="0" i="1" baseline="-25000" smtClean="0">
+                                <a:latin typeface="Cambria Math" panose="02040503050406030204" pitchFamily="18" charset="0"/>
+                              </a:rPr>
+                              <m:t>,</m:t>
+                            </m:r>
+                            <m:r>
+                              <a:rPr lang="en-GB" b="0" i="1" baseline="-25000" smtClean="0">
+                                <a:latin typeface="Cambria Math" panose="02040503050406030204" pitchFamily="18" charset="0"/>
+                              </a:rPr>
+                              <m:t>𝑛</m:t>
+                            </m:r>
+                            <m:r>
+                              <a:rPr lang="en-GB" b="0" i="1" smtClean="0">
+                                <a:latin typeface="Cambria Math" panose="02040503050406030204" pitchFamily="18" charset="0"/>
+                              </a:rPr>
+                              <m:t>(</m:t>
+                            </m:r>
+                            <m:r>
+                              <a:rPr lang="en-GB" b="0" i="1" smtClean="0">
+                                <a:latin typeface="Cambria Math" panose="02040503050406030204" pitchFamily="18" charset="0"/>
+                              </a:rPr>
+                              <m:t>𝑓</m:t>
+                            </m:r>
+                            <m:r>
+                              <a:rPr lang="en-GB" b="0" i="1" smtClean="0">
+                                <a:latin typeface="Cambria Math" panose="02040503050406030204" pitchFamily="18" charset="0"/>
+                              </a:rPr>
+                              <m:t>,</m:t>
+                            </m:r>
+                            <m:r>
+                              <a:rPr lang="en-GB" b="0" i="1" smtClean="0">
+                                <a:latin typeface="Cambria Math" panose="02040503050406030204" pitchFamily="18" charset="0"/>
+                              </a:rPr>
+                              <m:t>𝑛</m:t>
+                            </m:r>
+                            <m:r>
+                              <a:rPr lang="en-GB" b="0" i="1" smtClean="0">
+                                <a:latin typeface="Cambria Math" panose="02040503050406030204" pitchFamily="18" charset="0"/>
+                              </a:rPr>
+                              <m:t>)</m:t>
+                            </m:r>
+                          </m:e>
+                        </m:nary>
+                      </m:e>
+                    </m:nary>
+                  </m:oMath>
+                </a14:m>
+                <a:endParaRPr lang="en-GB" dirty="0"/>
+              </a:p>
+              <a:p>
+                <a:r>
+                  <a:rPr lang="en-GB" dirty="0"/>
+                  <a:t>the variance of a topic w in a user v’s news feed</a:t>
+                </a:r>
+              </a:p>
+              <a:p>
+                <a:pPr lvl="1"/>
+                <a:r>
+                  <a:rPr lang="en-GB" dirty="0"/>
+                  <a:t>Var[</a:t>
+                </a:r>
+                <a:r>
+                  <a:rPr lang="en-GB" dirty="0" err="1"/>
+                  <a:t>X</a:t>
+                </a:r>
+                <a:r>
+                  <a:rPr lang="en-GB" baseline="-25000" dirty="0" err="1"/>
+                  <a:t>w,v</a:t>
+                </a:r>
+                <a:r>
+                  <a:rPr lang="en-GB" dirty="0"/>
+                  <a:t>]</a:t>
+                </a:r>
+                <a14:m>
+                  <m:oMath xmlns:m="http://schemas.openxmlformats.org/officeDocument/2006/math">
+                    <m:r>
+                      <a:rPr lang="en-GB" i="1">
+                        <a:latin typeface="Cambria Math" panose="02040503050406030204" pitchFamily="18" charset="0"/>
+                      </a:rPr>
+                      <m:t>=</m:t>
+                    </m:r>
+                    <m:r>
+                      <a:rPr lang="de-CH" b="0" i="1" smtClean="0">
+                        <a:latin typeface="Cambria Math" panose="02040503050406030204" pitchFamily="18" charset="0"/>
+                      </a:rPr>
+                      <m:t>𝑣𝑎𝑟</m:t>
+                    </m:r>
+                    <m:r>
+                      <a:rPr lang="de-CH" b="0" i="1" smtClean="0">
+                        <a:latin typeface="Cambria Math" panose="02040503050406030204" pitchFamily="18" charset="0"/>
+                      </a:rPr>
+                      <m:t>[ </m:t>
+                    </m:r>
+                    <m:nary>
+                      <m:naryPr>
+                        <m:chr m:val="∑"/>
+                        <m:supHide m:val="on"/>
+                        <m:ctrlPr>
+                          <a:rPr lang="en-GB" i="1">
+                            <a:latin typeface="Cambria Math" panose="02040503050406030204" pitchFamily="18" charset="0"/>
+                          </a:rPr>
+                        </m:ctrlPr>
+                      </m:naryPr>
+                      <m:sub>
+                        <m:r>
+                          <m:rPr>
+                            <m:brk m:alnAt="7"/>
+                          </m:rPr>
+                          <a:rPr lang="en-GB" i="1">
+                            <a:latin typeface="Cambria Math" panose="02040503050406030204" pitchFamily="18" charset="0"/>
+                          </a:rPr>
+                          <m:t>𝑛</m:t>
+                        </m:r>
+                        <m:r>
+                          <a:rPr lang="en-GB" i="1">
+                            <a:latin typeface="Cambria Math" panose="02040503050406030204" pitchFamily="18" charset="0"/>
+                            <a:ea typeface="Cambria Math" panose="02040503050406030204" pitchFamily="18" charset="0"/>
+                          </a:rPr>
+                          <m:t>∈</m:t>
+                        </m:r>
+                        <m:r>
+                          <a:rPr lang="en-GB" i="1">
+                            <a:latin typeface="Cambria Math" panose="02040503050406030204" pitchFamily="18" charset="0"/>
+                            <a:ea typeface="Cambria Math" panose="02040503050406030204" pitchFamily="18" charset="0"/>
+                          </a:rPr>
+                          <m:t>𝑁</m:t>
+                        </m:r>
+                        <m:r>
+                          <a:rPr lang="en-GB" i="1">
+                            <a:latin typeface="Cambria Math" panose="02040503050406030204" pitchFamily="18" charset="0"/>
+                            <a:ea typeface="Cambria Math" panose="02040503050406030204" pitchFamily="18" charset="0"/>
+                          </a:rPr>
+                          <m:t>(</m:t>
+                        </m:r>
+                        <m:r>
+                          <a:rPr lang="en-GB" i="1">
+                            <a:latin typeface="Cambria Math" panose="02040503050406030204" pitchFamily="18" charset="0"/>
+                            <a:ea typeface="Cambria Math" panose="02040503050406030204" pitchFamily="18" charset="0"/>
+                          </a:rPr>
+                          <m:t>𝑣</m:t>
+                        </m:r>
+                        <m:r>
+                          <a:rPr lang="en-GB" i="1">
+                            <a:latin typeface="Cambria Math" panose="02040503050406030204" pitchFamily="18" charset="0"/>
+                            <a:ea typeface="Cambria Math" panose="02040503050406030204" pitchFamily="18" charset="0"/>
+                          </a:rPr>
+                          <m:t>)</m:t>
+                        </m:r>
+                      </m:sub>
+                      <m:sup/>
+                      <m:e>
+                        <m:nary>
+                          <m:naryPr>
+                            <m:chr m:val="∑"/>
+                            <m:supHide m:val="on"/>
+                            <m:ctrlPr>
+                              <a:rPr lang="en-GB" i="1">
+                                <a:latin typeface="Cambria Math" panose="02040503050406030204" pitchFamily="18" charset="0"/>
+                              </a:rPr>
+                            </m:ctrlPr>
+                          </m:naryPr>
+                          <m:sub>
+                            <m:r>
+                              <m:rPr>
+                                <m:brk m:alnAt="7"/>
+                              </m:rPr>
+                              <a:rPr lang="en-GB" i="1">
+                                <a:latin typeface="Cambria Math" panose="02040503050406030204" pitchFamily="18" charset="0"/>
+                              </a:rPr>
+                              <m:t>1</m:t>
+                            </m:r>
+                            <m:r>
+                              <a:rPr lang="en-GB" i="1">
+                                <a:latin typeface="Cambria Math" panose="02040503050406030204" pitchFamily="18" charset="0"/>
+                                <a:ea typeface="Cambria Math" panose="02040503050406030204" pitchFamily="18" charset="0"/>
+                              </a:rPr>
+                              <m:t>≤</m:t>
+                            </m:r>
+                            <m:r>
+                              <a:rPr lang="en-GB" i="1">
+                                <a:latin typeface="Cambria Math" panose="02040503050406030204" pitchFamily="18" charset="0"/>
+                                <a:ea typeface="Cambria Math" panose="02040503050406030204" pitchFamily="18" charset="0"/>
+                              </a:rPr>
+                              <m:t>𝑖</m:t>
+                            </m:r>
+                            <m:r>
+                              <a:rPr lang="en-GB" i="1">
+                                <a:latin typeface="Cambria Math" panose="02040503050406030204" pitchFamily="18" charset="0"/>
+                                <a:ea typeface="Cambria Math" panose="02040503050406030204" pitchFamily="18" charset="0"/>
+                              </a:rPr>
+                              <m:t>≤</m:t>
+                            </m:r>
+                            <m:r>
+                              <a:rPr lang="en-GB" i="1">
+                                <a:latin typeface="Cambria Math" panose="02040503050406030204" pitchFamily="18" charset="0"/>
+                                <a:ea typeface="Cambria Math" panose="02040503050406030204" pitchFamily="18" charset="0"/>
+                              </a:rPr>
+                              <m:t>𝑀𝑣</m:t>
+                            </m:r>
+                            <m:r>
+                              <a:rPr lang="en-GB" i="1" baseline="-25000">
+                                <a:latin typeface="Cambria Math" panose="02040503050406030204" pitchFamily="18" charset="0"/>
+                                <a:ea typeface="Cambria Math" panose="02040503050406030204" pitchFamily="18" charset="0"/>
+                              </a:rPr>
+                              <m:t>,</m:t>
+                            </m:r>
+                            <m:r>
+                              <a:rPr lang="en-GB" i="1" baseline="-25000">
+                                <a:latin typeface="Cambria Math" panose="02040503050406030204" pitchFamily="18" charset="0"/>
+                                <a:ea typeface="Cambria Math" panose="02040503050406030204" pitchFamily="18" charset="0"/>
+                              </a:rPr>
+                              <m:t>𝑛</m:t>
+                            </m:r>
+                          </m:sub>
+                          <m:sup/>
+                          <m:e>
+                            <m:r>
+                              <a:rPr lang="en-GB" i="1">
+                                <a:latin typeface="Cambria Math" panose="02040503050406030204" pitchFamily="18" charset="0"/>
+                              </a:rPr>
+                              <m:t>𝐷</m:t>
+                            </m:r>
+                            <m:r>
+                              <a:rPr lang="en-GB" i="1" baseline="-25000">
+                                <a:latin typeface="Cambria Math" panose="02040503050406030204" pitchFamily="18" charset="0"/>
+                              </a:rPr>
+                              <m:t>𝑤</m:t>
+                            </m:r>
+                            <m:r>
+                              <a:rPr lang="en-GB" i="1" baseline="-25000">
+                                <a:latin typeface="Cambria Math" panose="02040503050406030204" pitchFamily="18" charset="0"/>
+                              </a:rPr>
+                              <m:t>,</m:t>
+                            </m:r>
+                            <m:r>
+                              <a:rPr lang="en-GB" i="1" baseline="-25000">
+                                <a:latin typeface="Cambria Math" panose="02040503050406030204" pitchFamily="18" charset="0"/>
+                              </a:rPr>
+                              <m:t>𝑛</m:t>
+                            </m:r>
+                            <m:r>
+                              <a:rPr lang="en-GB" i="1">
+                                <a:latin typeface="Cambria Math" panose="02040503050406030204" pitchFamily="18" charset="0"/>
+                              </a:rPr>
+                              <m:t>(</m:t>
+                            </m:r>
+                            <m:r>
+                              <a:rPr lang="en-GB" i="1">
+                                <a:latin typeface="Cambria Math" panose="02040503050406030204" pitchFamily="18" charset="0"/>
+                              </a:rPr>
+                              <m:t>𝑓</m:t>
+                            </m:r>
+                            <m:r>
+                              <a:rPr lang="en-GB" i="1">
+                                <a:latin typeface="Cambria Math" panose="02040503050406030204" pitchFamily="18" charset="0"/>
+                              </a:rPr>
+                              <m:t>,</m:t>
+                            </m:r>
+                            <m:r>
+                              <a:rPr lang="en-GB" i="1">
+                                <a:latin typeface="Cambria Math" panose="02040503050406030204" pitchFamily="18" charset="0"/>
+                              </a:rPr>
+                              <m:t>𝑛</m:t>
+                            </m:r>
+                            <m:r>
+                              <a:rPr lang="en-GB" i="1">
+                                <a:latin typeface="Cambria Math" panose="02040503050406030204" pitchFamily="18" charset="0"/>
+                              </a:rPr>
+                              <m:t>)]</m:t>
+                            </m:r>
+                          </m:e>
+                        </m:nary>
+                      </m:e>
+                    </m:nary>
+                  </m:oMath>
+                </a14:m>
+                <a:endParaRPr lang="en-GB" dirty="0"/>
+              </a:p>
+              <a:p>
+                <a:r>
+                  <a:rPr lang="de-CH" dirty="0"/>
+                  <a:t>C</a:t>
+                </a:r>
+                <a:r>
+                  <a:rPr lang="en-GB" dirty="0" err="1"/>
+                  <a:t>ombine</a:t>
+                </a:r>
+                <a:r>
+                  <a:rPr lang="en-GB" dirty="0"/>
+                  <a:t> with static user interests</a:t>
+                </a:r>
+              </a:p>
+              <a:p>
+                <a:pPr lvl="1"/>
+                <a14:m>
+                  <m:oMath xmlns:m="http://schemas.openxmlformats.org/officeDocument/2006/math">
+                    <m:func>
+                      <m:funcPr>
+                        <m:ctrlPr>
+                          <a:rPr lang="en-GB" i="1" smtClean="0">
+                            <a:latin typeface="Cambria Math" panose="02040503050406030204" pitchFamily="18" charset="0"/>
+                          </a:rPr>
+                        </m:ctrlPr>
+                      </m:funcPr>
+                      <m:fName>
+                        <m:limLow>
+                          <m:limLowPr>
+                            <m:ctrlPr>
+                              <a:rPr lang="en-GB" i="1" smtClean="0">
+                                <a:latin typeface="Cambria Math" panose="02040503050406030204" pitchFamily="18" charset="0"/>
+                              </a:rPr>
+                            </m:ctrlPr>
+                          </m:limLowPr>
+                          <m:e>
+                            <m:r>
+                              <m:rPr>
+                                <m:sty m:val="p"/>
+                              </m:rPr>
+                              <a:rPr lang="en-GB" i="0" smtClean="0">
+                                <a:latin typeface="Cambria Math" panose="02040503050406030204" pitchFamily="18" charset="0"/>
+                              </a:rPr>
+                              <m:t>max</m:t>
+                            </m:r>
+                          </m:e>
+                          <m:lim>
+                            <m:r>
+                              <a:rPr lang="de-CH" b="0" i="1" smtClean="0">
+                                <a:latin typeface="Cambria Math" panose="02040503050406030204" pitchFamily="18" charset="0"/>
+                              </a:rPr>
+                              <m:t>𝑤</m:t>
+                            </m:r>
+                            <m:r>
+                              <a:rPr lang="de-CH" b="0" i="1" smtClean="0">
+                                <a:latin typeface="Cambria Math" panose="02040503050406030204" pitchFamily="18" charset="0"/>
+                                <a:ea typeface="Cambria Math" panose="02040503050406030204" pitchFamily="18" charset="0"/>
+                              </a:rPr>
+                              <m:t>∈</m:t>
+                            </m:r>
+                            <m:r>
+                              <a:rPr lang="de-CH" b="0" i="1" smtClean="0">
+                                <a:latin typeface="Cambria Math" panose="02040503050406030204" pitchFamily="18" charset="0"/>
+                                <a:ea typeface="Cambria Math" panose="02040503050406030204" pitchFamily="18" charset="0"/>
+                              </a:rPr>
+                              <m:t>𝑇</m:t>
+                            </m:r>
+                          </m:lim>
+                        </m:limLow>
+                      </m:fName>
+                      <m:e>
+                        <m:f>
+                          <m:fPr>
+                            <m:ctrlPr>
+                              <a:rPr lang="en-GB" i="1" smtClean="0">
+                                <a:latin typeface="Cambria Math" panose="02040503050406030204" pitchFamily="18" charset="0"/>
+                              </a:rPr>
+                            </m:ctrlPr>
+                          </m:fPr>
+                          <m:num>
+                            <m:f>
+                              <m:fPr>
+                                <m:ctrlPr>
+                                  <a:rPr lang="en-GB" i="1" smtClean="0">
+                                    <a:latin typeface="Cambria Math" panose="02040503050406030204" pitchFamily="18" charset="0"/>
+                                  </a:rPr>
+                                </m:ctrlPr>
+                              </m:fPr>
+                              <m:num>
+                                <m:r>
+                                  <a:rPr lang="de-CH" b="0" i="1" smtClean="0">
+                                    <a:latin typeface="Cambria Math" panose="02040503050406030204" pitchFamily="18" charset="0"/>
+                                  </a:rPr>
+                                  <m:t>1−</m:t>
+                                </m:r>
+                                <m:r>
+                                  <a:rPr lang="de-CH" b="0" i="1" smtClean="0">
+                                    <a:latin typeface="Cambria Math" panose="02040503050406030204" pitchFamily="18" charset="0"/>
+                                    <a:ea typeface="Cambria Math" panose="02040503050406030204" pitchFamily="18" charset="0"/>
+                                  </a:rPr>
+                                  <m:t>∝</m:t>
+                                </m:r>
+                              </m:num>
+                              <m:den>
+                                <m:r>
+                                  <a:rPr lang="de-CH" b="0" i="1" smtClean="0">
+                                    <a:latin typeface="Cambria Math" panose="02040503050406030204" pitchFamily="18" charset="0"/>
+                                  </a:rPr>
+                                  <m:t>𝑚</m:t>
+                                </m:r>
+                              </m:den>
+                            </m:f>
+                            <m:rad>
+                              <m:radPr>
+                                <m:degHide m:val="on"/>
+                                <m:ctrlPr>
+                                  <a:rPr lang="en-GB" i="1" smtClean="0">
+                                    <a:latin typeface="Cambria Math" panose="02040503050406030204" pitchFamily="18" charset="0"/>
+                                  </a:rPr>
+                                </m:ctrlPr>
+                              </m:radPr>
+                              <m:deg/>
+                              <m:e>
+                                <m:r>
+                                  <a:rPr lang="de-CH" b="0" i="1" smtClean="0">
+                                    <a:latin typeface="Cambria Math" panose="02040503050406030204" pitchFamily="18" charset="0"/>
+                                  </a:rPr>
+                                  <m:t>𝑣𝑎𝑟</m:t>
+                                </m:r>
+                                <m:r>
+                                  <a:rPr lang="de-CH" b="0" i="1" smtClean="0">
+                                    <a:latin typeface="Cambria Math" panose="02040503050406030204" pitchFamily="18" charset="0"/>
+                                  </a:rPr>
+                                  <m:t>[</m:t>
+                                </m:r>
+                                <m:r>
+                                  <a:rPr lang="de-CH" b="0" i="1" smtClean="0">
+                                    <a:latin typeface="Cambria Math" panose="02040503050406030204" pitchFamily="18" charset="0"/>
+                                  </a:rPr>
+                                  <m:t>𝑋𝑤</m:t>
+                                </m:r>
+                                <m:r>
+                                  <a:rPr lang="de-CH" b="0" i="1" baseline="-25000" smtClean="0">
+                                    <a:latin typeface="Cambria Math" panose="02040503050406030204" pitchFamily="18" charset="0"/>
+                                  </a:rPr>
+                                  <m:t>,</m:t>
+                                </m:r>
+                                <m:r>
+                                  <a:rPr lang="de-CH" b="0" i="1" baseline="-25000" smtClean="0">
+                                    <a:latin typeface="Cambria Math" panose="02040503050406030204" pitchFamily="18" charset="0"/>
+                                  </a:rPr>
+                                  <m:t>𝑣</m:t>
+                                </m:r>
+                                <m:r>
+                                  <a:rPr lang="de-CH" b="0" i="1" smtClean="0">
+                                    <a:latin typeface="Cambria Math" panose="02040503050406030204" pitchFamily="18" charset="0"/>
+                                  </a:rPr>
+                                  <m:t>]</m:t>
+                                </m:r>
+                              </m:e>
+                            </m:rad>
+                          </m:num>
+                          <m:den>
+                            <m:r>
+                              <a:rPr lang="en-GB" i="1" smtClean="0">
+                                <a:latin typeface="Cambria Math" panose="02040503050406030204" pitchFamily="18" charset="0"/>
+                                <a:ea typeface="Cambria Math" panose="02040503050406030204" pitchFamily="18" charset="0"/>
+                              </a:rPr>
+                              <m:t>∝</m:t>
+                            </m:r>
+                            <m:r>
+                              <a:rPr lang="de-CH" b="0" i="1" smtClean="0">
+                                <a:latin typeface="Cambria Math" panose="02040503050406030204" pitchFamily="18" charset="0"/>
+                                <a:ea typeface="Cambria Math" panose="02040503050406030204" pitchFamily="18" charset="0"/>
+                              </a:rPr>
+                              <m:t>.</m:t>
+                            </m:r>
+                            <m:r>
+                              <a:rPr lang="de-CH" b="0" i="1" smtClean="0">
+                                <a:latin typeface="Cambria Math" panose="02040503050406030204" pitchFamily="18" charset="0"/>
+                                <a:ea typeface="Cambria Math" panose="02040503050406030204" pitchFamily="18" charset="0"/>
+                              </a:rPr>
+                              <m:t>𝑟𝑒𝑙</m:t>
+                            </m:r>
+                            <m:d>
+                              <m:dPr>
+                                <m:ctrlPr>
+                                  <a:rPr lang="de-CH" b="0" i="1" smtClean="0">
+                                    <a:latin typeface="Cambria Math" panose="02040503050406030204" pitchFamily="18" charset="0"/>
+                                    <a:ea typeface="Cambria Math" panose="02040503050406030204" pitchFamily="18" charset="0"/>
+                                  </a:rPr>
+                                </m:ctrlPr>
+                              </m:dPr>
+                              <m:e>
+                                <m:r>
+                                  <a:rPr lang="de-CH" b="0" i="1" smtClean="0">
+                                    <a:latin typeface="Cambria Math" panose="02040503050406030204" pitchFamily="18" charset="0"/>
+                                    <a:ea typeface="Cambria Math" panose="02040503050406030204" pitchFamily="18" charset="0"/>
+                                  </a:rPr>
+                                  <m:t>𝑢</m:t>
+                                </m:r>
+                                <m:r>
+                                  <a:rPr lang="de-CH" b="0" i="1" smtClean="0">
+                                    <a:latin typeface="Cambria Math" panose="02040503050406030204" pitchFamily="18" charset="0"/>
+                                    <a:ea typeface="Cambria Math" panose="02040503050406030204" pitchFamily="18" charset="0"/>
+                                  </a:rPr>
+                                  <m:t>,</m:t>
+                                </m:r>
+                                <m:r>
+                                  <a:rPr lang="de-CH" b="0" i="1" smtClean="0">
+                                    <a:latin typeface="Cambria Math" panose="02040503050406030204" pitchFamily="18" charset="0"/>
+                                    <a:ea typeface="Cambria Math" panose="02040503050406030204" pitchFamily="18" charset="0"/>
+                                  </a:rPr>
+                                  <m:t>𝑤</m:t>
+                                </m:r>
+                              </m:e>
+                            </m:d>
+                            <m:r>
+                              <a:rPr lang="de-CH" b="0" i="1" smtClean="0">
+                                <a:latin typeface="Cambria Math" panose="02040503050406030204" pitchFamily="18" charset="0"/>
+                                <a:ea typeface="Cambria Math" panose="02040503050406030204" pitchFamily="18" charset="0"/>
+                              </a:rPr>
+                              <m:t>+</m:t>
+                            </m:r>
+                            <m:f>
+                              <m:fPr>
+                                <m:ctrlPr>
+                                  <a:rPr lang="de-CH" b="0" i="1" smtClean="0">
+                                    <a:latin typeface="Cambria Math" panose="02040503050406030204" pitchFamily="18" charset="0"/>
+                                    <a:ea typeface="Cambria Math" panose="02040503050406030204" pitchFamily="18" charset="0"/>
+                                  </a:rPr>
+                                </m:ctrlPr>
+                              </m:fPr>
+                              <m:num>
+                                <m:r>
+                                  <a:rPr lang="de-CH" b="0" i="1" smtClean="0">
+                                    <a:latin typeface="Cambria Math" panose="02040503050406030204" pitchFamily="18" charset="0"/>
+                                    <a:ea typeface="Cambria Math" panose="02040503050406030204" pitchFamily="18" charset="0"/>
+                                  </a:rPr>
+                                  <m:t>1−∝</m:t>
+                                </m:r>
+                              </m:num>
+                              <m:den>
+                                <m:r>
+                                  <a:rPr lang="de-CH" b="0" i="1" smtClean="0">
+                                    <a:latin typeface="Cambria Math" panose="02040503050406030204" pitchFamily="18" charset="0"/>
+                                    <a:ea typeface="Cambria Math" panose="02040503050406030204" pitchFamily="18" charset="0"/>
+                                  </a:rPr>
+                                  <m:t>𝑚</m:t>
+                                </m:r>
+                              </m:den>
+                            </m:f>
+                            <m:r>
+                              <a:rPr lang="de-CH" b="0" i="1" smtClean="0">
+                                <a:latin typeface="Cambria Math" panose="02040503050406030204" pitchFamily="18" charset="0"/>
+                                <a:ea typeface="Cambria Math" panose="02040503050406030204" pitchFamily="18" charset="0"/>
+                              </a:rPr>
+                              <m:t>.</m:t>
+                            </m:r>
+                            <m:r>
+                              <a:rPr lang="de-CH" b="0" i="1" smtClean="0">
+                                <a:latin typeface="Cambria Math" panose="02040503050406030204" pitchFamily="18" charset="0"/>
+                                <a:ea typeface="Cambria Math" panose="02040503050406030204" pitchFamily="18" charset="0"/>
+                              </a:rPr>
+                              <m:t>𝐸</m:t>
+                            </m:r>
+                            <m:r>
+                              <a:rPr lang="de-CH" b="0" i="1" smtClean="0">
+                                <a:latin typeface="Cambria Math" panose="02040503050406030204" pitchFamily="18" charset="0"/>
+                                <a:ea typeface="Cambria Math" panose="02040503050406030204" pitchFamily="18" charset="0"/>
+                              </a:rPr>
+                              <m:t>[</m:t>
+                            </m:r>
+                            <m:r>
+                              <a:rPr lang="de-CH" b="0" i="1" smtClean="0">
+                                <a:latin typeface="Cambria Math" panose="02040503050406030204" pitchFamily="18" charset="0"/>
+                                <a:ea typeface="Cambria Math" panose="02040503050406030204" pitchFamily="18" charset="0"/>
+                              </a:rPr>
+                              <m:t>𝑋𝑣</m:t>
+                            </m:r>
+                            <m:r>
+                              <a:rPr lang="de-CH" b="0" i="1" baseline="-25000" smtClean="0">
+                                <a:latin typeface="Cambria Math" panose="02040503050406030204" pitchFamily="18" charset="0"/>
+                                <a:ea typeface="Cambria Math" panose="02040503050406030204" pitchFamily="18" charset="0"/>
+                              </a:rPr>
+                              <m:t>,</m:t>
+                            </m:r>
+                            <m:r>
+                              <a:rPr lang="de-CH" b="0" i="1" baseline="-25000" smtClean="0">
+                                <a:latin typeface="Cambria Math" panose="02040503050406030204" pitchFamily="18" charset="0"/>
+                                <a:ea typeface="Cambria Math" panose="02040503050406030204" pitchFamily="18" charset="0"/>
+                              </a:rPr>
+                              <m:t>𝑤</m:t>
+                            </m:r>
+                            <m:r>
+                              <a:rPr lang="de-CH" b="0" i="1" smtClean="0">
+                                <a:latin typeface="Cambria Math" panose="02040503050406030204" pitchFamily="18" charset="0"/>
+                                <a:ea typeface="Cambria Math" panose="02040503050406030204" pitchFamily="18" charset="0"/>
+                              </a:rPr>
+                              <m:t>]</m:t>
+                            </m:r>
+                          </m:den>
+                        </m:f>
+                      </m:e>
+                    </m:func>
+                  </m:oMath>
+                </a14:m>
+                <a:endParaRPr lang="en-GB" dirty="0"/>
+              </a:p>
+              <a:p>
+                <a:endParaRPr lang="en-GB" dirty="0"/>
+              </a:p>
+            </p:txBody>
+          </p:sp>
+        </mc:Choice>
+        <mc:Fallback>
+          <p:sp>
+            <p:nvSpPr>
+              <p:cNvPr id="3" name="Content Placeholder 2">
+                <a:extLst>
+                  <a:ext uri="{FF2B5EF4-FFF2-40B4-BE49-F238E27FC236}">
+                    <a16:creationId xmlns:a16="http://schemas.microsoft.com/office/drawing/2014/main" id="{0D28A200-2292-42CC-BEF7-54AAB2961DE9}"/>
+                  </a:ext>
+                </a:extLst>
+              </p:cNvPr>
+              <p:cNvSpPr>
+                <a:spLocks noGrp="1" noRot="1" noChangeAspect="1" noMove="1" noResize="1" noEditPoints="1" noAdjustHandles="1" noChangeArrowheads="1" noChangeShapeType="1" noTextEdit="1"/>
+              </p:cNvSpPr>
+              <p:nvPr>
+                <p:ph idx="1"/>
+              </p:nvPr>
+            </p:nvSpPr>
+            <p:spPr>
+              <a:blipFill>
+                <a:blip r:embed="rId2"/>
+                <a:stretch>
+                  <a:fillRect l="-571" t="-2240"/>
+                </a:stretch>
+              </a:blipFill>
+            </p:spPr>
+            <p:txBody>
+              <a:bodyPr/>
+              <a:lstStyle/>
+              <a:p>
+                <a:r>
+                  <a:rPr lang="en-GB">
+                    <a:noFill/>
+                  </a:rPr>
+                  <a:t> </a:t>
+                </a:r>
+              </a:p>
+            </p:txBody>
+          </p:sp>
+        </mc:Fallback>
+      </mc:AlternateContent>
       <p:sp>
         <p:nvSpPr>
           <p:cNvPr id="4" name="Footer Placeholder 3">
@@ -11076,6 +11885,464 @@
     <p:extLst>
       <p:ext uri="{BB962C8B-B14F-4D97-AF65-F5344CB8AC3E}">
         <p14:creationId xmlns:p14="http://schemas.microsoft.com/office/powerpoint/2010/main" val="4237350263"/>
+      </p:ext>
+    </p:extLst>
+  </p:cSld>
+  <p:clrMapOvr>
+    <a:masterClrMapping/>
+  </p:clrMapOvr>
+  <mc:AlternateContent xmlns:mc="http://schemas.openxmlformats.org/markup-compatibility/2006" xmlns:p14="http://schemas.microsoft.com/office/powerpoint/2010/main">
+    <mc:Choice Requires="p14">
+      <p:transition spd="med" p14:dur="700">
+        <p:fade/>
+      </p:transition>
+    </mc:Choice>
+    <mc:Fallback xmlns="">
+      <p:transition spd="med">
+        <p:fade/>
+      </p:transition>
+    </mc:Fallback>
+  </mc:AlternateContent>
+</p:sld>
+</file>
+
+<file path=ppt/slides/slide14.xml><?xml version="1.0" encoding="utf-8"?>
+<p:sld xmlns:a="http://schemas.openxmlformats.org/drawingml/2006/main" xmlns:r="http://schemas.openxmlformats.org/officeDocument/2006/relationships" xmlns:p="http://schemas.openxmlformats.org/presentationml/2006/main">
+  <p:cSld>
+    <p:spTree>
+      <p:nvGrpSpPr>
+        <p:cNvPr id="1" name=""/>
+        <p:cNvGrpSpPr/>
+        <p:nvPr/>
+      </p:nvGrpSpPr>
+      <p:grpSpPr>
+        <a:xfrm>
+          <a:off x="0" y="0"/>
+          <a:ext cx="0" cy="0"/>
+          <a:chOff x="0" y="0"/>
+          <a:chExt cx="0" cy="0"/>
+        </a:xfrm>
+      </p:grpSpPr>
+      <p:sp>
+        <p:nvSpPr>
+          <p:cNvPr id="2" name="Title 1">
+            <a:extLst>
+              <a:ext uri="{FF2B5EF4-FFF2-40B4-BE49-F238E27FC236}">
+                <a16:creationId xmlns:a16="http://schemas.microsoft.com/office/drawing/2014/main" id="{709467A9-544F-4814-9C4E-22B36D7D4C56}"/>
+              </a:ext>
+            </a:extLst>
+          </p:cNvPr>
+          <p:cNvSpPr>
+            <a:spLocks noGrp="1"/>
+          </p:cNvSpPr>
+          <p:nvPr>
+            <p:ph type="title"/>
+          </p:nvPr>
+        </p:nvSpPr>
+        <p:spPr/>
+        <p:txBody>
+          <a:bodyPr/>
+          <a:lstStyle/>
+          <a:p>
+            <a:r>
+              <a:rPr lang="de-CH" dirty="0"/>
+              <a:t>Hybrid model</a:t>
+            </a:r>
+            <a:endParaRPr lang="en-GB" dirty="0"/>
+          </a:p>
+        </p:txBody>
+      </p:sp>
+      <mc:AlternateContent xmlns:mc="http://schemas.openxmlformats.org/markup-compatibility/2006">
+        <mc:Choice xmlns:a14="http://schemas.microsoft.com/office/drawing/2010/main" Requires="a14">
+          <p:sp>
+            <p:nvSpPr>
+              <p:cNvPr id="3" name="Content Placeholder 2">
+                <a:extLst>
+                  <a:ext uri="{FF2B5EF4-FFF2-40B4-BE49-F238E27FC236}">
+                    <a16:creationId xmlns:a16="http://schemas.microsoft.com/office/drawing/2014/main" id="{5A9FE4AE-1FA6-4134-9ACF-79A929F4FEA6}"/>
+                  </a:ext>
+                </a:extLst>
+              </p:cNvPr>
+              <p:cNvSpPr>
+                <a:spLocks noGrp="1"/>
+              </p:cNvSpPr>
+              <p:nvPr>
+                <p:ph idx="1"/>
+              </p:nvPr>
+            </p:nvSpPr>
+            <p:spPr/>
+            <p:txBody>
+              <a:bodyPr>
+                <a:normAutofit/>
+              </a:bodyPr>
+              <a:lstStyle/>
+              <a:p>
+                <a:r>
+                  <a:rPr lang="en-GB" i="1" dirty="0"/>
+                  <a:t>the ratio of the read frequency of user v to the write frequency of v’s neighbours will also affect the retrieval strategy selection and is ignored in the above model.</a:t>
+                </a:r>
+              </a:p>
+              <a:p>
+                <a14:m>
+                  <m:oMath xmlns:m="http://schemas.openxmlformats.org/officeDocument/2006/math">
+                    <m:r>
+                      <m:rPr>
+                        <m:sty m:val="p"/>
+                      </m:rPr>
+                      <a:rPr lang="de-CH" b="0" i="0" smtClean="0">
+                        <a:latin typeface="Cambria Math" panose="02040503050406030204" pitchFamily="18" charset="0"/>
+                      </a:rPr>
+                      <m:t>p</m:t>
+                    </m:r>
+                    <m:r>
+                      <a:rPr lang="de-CH" b="0" i="0" baseline="20000" smtClean="0">
+                        <a:latin typeface="Cambria Math" panose="02040503050406030204" pitchFamily="18" charset="0"/>
+                      </a:rPr>
+                      <m:t>∗</m:t>
+                    </m:r>
+                    <m:d>
+                      <m:dPr>
+                        <m:ctrlPr>
+                          <a:rPr lang="de-CH" b="0" smtClean="0">
+                            <a:latin typeface="Cambria Math" panose="02040503050406030204" pitchFamily="18" charset="0"/>
+                          </a:rPr>
+                        </m:ctrlPr>
+                      </m:dPr>
+                      <m:e>
+                        <m:r>
+                          <m:rPr>
+                            <m:sty m:val="p"/>
+                          </m:rPr>
+                          <a:rPr lang="de-CH" b="0" i="0" smtClean="0">
+                            <a:latin typeface="Cambria Math" panose="02040503050406030204" pitchFamily="18" charset="0"/>
+                          </a:rPr>
+                          <m:t>v</m:t>
+                        </m:r>
+                      </m:e>
+                    </m:d>
+                    <m:r>
+                      <a:rPr lang="de-CH" b="0" i="0" smtClean="0">
+                        <a:latin typeface="Cambria Math" panose="02040503050406030204" pitchFamily="18" charset="0"/>
+                      </a:rPr>
+                      <m:t>=</m:t>
+                    </m:r>
+                    <m:f>
+                      <m:fPr>
+                        <m:ctrlPr>
+                          <a:rPr lang="en-GB">
+                            <a:latin typeface="Cambria Math" panose="02040503050406030204" pitchFamily="18" charset="0"/>
+                          </a:rPr>
+                        </m:ctrlPr>
+                      </m:fPr>
+                      <m:num>
+                        <m:nary>
+                          <m:naryPr>
+                            <m:chr m:val="∑"/>
+                            <m:supHide m:val="on"/>
+                            <m:ctrlPr>
+                              <a:rPr lang="en-GB">
+                                <a:latin typeface="Cambria Math" panose="02040503050406030204" pitchFamily="18" charset="0"/>
+                              </a:rPr>
+                            </m:ctrlPr>
+                          </m:naryPr>
+                          <m:sub>
+                            <m:r>
+                              <m:rPr>
+                                <m:sty m:val="p"/>
+                                <m:brk m:alnAt="7"/>
+                              </m:rPr>
+                              <a:rPr lang="de-CH" i="0" smtClean="0">
+                                <a:latin typeface="Cambria Math" panose="02040503050406030204" pitchFamily="18" charset="0"/>
+                              </a:rPr>
+                              <m:t>n</m:t>
+                            </m:r>
+                            <m:r>
+                              <a:rPr lang="de-CH" i="0">
+                                <a:latin typeface="Cambria Math" panose="02040503050406030204" pitchFamily="18" charset="0"/>
+                              </a:rPr>
+                              <m:t>∈</m:t>
+                            </m:r>
+                            <m:r>
+                              <m:rPr>
+                                <m:sty m:val="p"/>
+                              </m:rPr>
+                              <a:rPr lang="de-CH" i="0">
+                                <a:latin typeface="Cambria Math" panose="02040503050406030204" pitchFamily="18" charset="0"/>
+                              </a:rPr>
+                              <m:t>N</m:t>
+                            </m:r>
+                            <m:r>
+                              <a:rPr lang="de-CH" i="0">
+                                <a:latin typeface="Cambria Math" panose="02040503050406030204" pitchFamily="18" charset="0"/>
+                              </a:rPr>
+                              <m:t>(</m:t>
+                            </m:r>
+                            <m:r>
+                              <m:rPr>
+                                <m:sty m:val="p"/>
+                              </m:rPr>
+                              <a:rPr lang="de-CH" i="0">
+                                <a:latin typeface="Cambria Math" panose="02040503050406030204" pitchFamily="18" charset="0"/>
+                              </a:rPr>
+                              <m:t>v</m:t>
+                            </m:r>
+                            <m:r>
+                              <a:rPr lang="de-CH" i="0">
+                                <a:latin typeface="Cambria Math" panose="02040503050406030204" pitchFamily="18" charset="0"/>
+                              </a:rPr>
+                              <m:t>)</m:t>
+                            </m:r>
+                          </m:sub>
+                          <m:sup/>
+                          <m:e>
+                            <m:r>
+                              <m:rPr>
+                                <m:nor/>
+                              </m:rPr>
+                              <a:rPr lang="el-GR">
+                                <a:latin typeface="Cambria Math" panose="02040503050406030204" pitchFamily="18" charset="0"/>
+                              </a:rPr>
+                              <m:t>λ</m:t>
+                            </m:r>
+                            <m:r>
+                              <m:rPr>
+                                <m:nor/>
+                              </m:rPr>
+                              <a:rPr lang="en-GB">
+                                <a:latin typeface="Cambria Math" panose="02040503050406030204" pitchFamily="18" charset="0"/>
+                              </a:rPr>
+                              <m:t>n</m:t>
+                            </m:r>
+                          </m:e>
+                        </m:nary>
+                      </m:num>
+                      <m:den>
+                        <m:r>
+                          <m:rPr>
+                            <m:nor/>
+                          </m:rPr>
+                          <a:rPr lang="el-GR">
+                            <a:latin typeface="Cambria Math" panose="02040503050406030204" pitchFamily="18" charset="0"/>
+                          </a:rPr>
+                          <m:t>η</m:t>
+                        </m:r>
+                        <m:r>
+                          <m:rPr>
+                            <m:nor/>
+                          </m:rPr>
+                          <a:rPr lang="en-GB">
+                            <a:latin typeface="Cambria Math" panose="02040503050406030204" pitchFamily="18" charset="0"/>
+                          </a:rPr>
+                          <m:t>v</m:t>
+                        </m:r>
+                      </m:den>
+                    </m:f>
+                  </m:oMath>
+                </a14:m>
+                <a:r>
+                  <a:rPr lang="en-GB" dirty="0">
+                    <a:latin typeface="Cambria Math" panose="02040503050406030204" pitchFamily="18" charset="0"/>
+                  </a:rPr>
+                  <a:t>.p(v)</a:t>
+                </a:r>
+              </a:p>
+              <a:p>
+                <a:r>
+                  <a:rPr lang="en-GB" dirty="0"/>
+                  <a:t>Finally, we can use ρ</a:t>
+                </a:r>
+                <a:r>
+                  <a:rPr lang="en-GB" baseline="30000" dirty="0"/>
+                  <a:t>∗</a:t>
+                </a:r>
+                <a:r>
+                  <a:rPr lang="en-GB" dirty="0"/>
+                  <a:t>(v) to determine the retrieval strategy</a:t>
+                </a:r>
+                <a:r>
+                  <a:rPr lang="ar-SY" dirty="0"/>
+                  <a:t> </a:t>
+                </a:r>
+                <a:r>
+                  <a:rPr lang="en-GB" dirty="0"/>
+                  <a:t>for user v. If ρ</a:t>
+                </a:r>
+                <a:r>
+                  <a:rPr lang="en-GB" baseline="30000" dirty="0"/>
+                  <a:t>∗</a:t>
+                </a:r>
+                <a:r>
+                  <a:rPr lang="en-GB" dirty="0"/>
+                  <a:t>(v) is smaller than a pre-defined threshold </a:t>
+                </a:r>
+                <a:r>
+                  <a:rPr lang="en-GB" dirty="0" err="1"/>
+                  <a:t>ρ</a:t>
+                </a:r>
+                <a:r>
+                  <a:rPr lang="en-GB" baseline="-25000" dirty="0" err="1"/>
+                  <a:t>max</a:t>
+                </a:r>
+                <a:r>
+                  <a:rPr lang="en-GB" dirty="0"/>
+                  <a:t>, we adopt the </a:t>
+                </a:r>
+                <a:r>
+                  <a:rPr lang="en-GB" i="1" dirty="0"/>
+                  <a:t>safe region </a:t>
+                </a:r>
+                <a:r>
+                  <a:rPr lang="en-GB" dirty="0"/>
+                  <a:t>strategy for user v. Otherwise </a:t>
+                </a:r>
+                <a:r>
+                  <a:rPr lang="en-GB" i="1" dirty="0"/>
+                  <a:t>online retrieval </a:t>
+                </a:r>
+                <a:r>
+                  <a:rPr lang="en-GB" dirty="0"/>
+                  <a:t>is used when v logins/refreshes its personal social page.</a:t>
+                </a:r>
+              </a:p>
+              <a:p>
+                <a:endParaRPr lang="en-GB" dirty="0">
+                  <a:latin typeface="Cambria Math" panose="02040503050406030204" pitchFamily="18" charset="0"/>
+                </a:endParaRPr>
+              </a:p>
+            </p:txBody>
+          </p:sp>
+        </mc:Choice>
+        <mc:Fallback>
+          <p:sp>
+            <p:nvSpPr>
+              <p:cNvPr id="3" name="Content Placeholder 2">
+                <a:extLst>
+                  <a:ext uri="{FF2B5EF4-FFF2-40B4-BE49-F238E27FC236}">
+                    <a16:creationId xmlns:a16="http://schemas.microsoft.com/office/drawing/2014/main" id="{5A9FE4AE-1FA6-4134-9ACF-79A929F4FEA6}"/>
+                  </a:ext>
+                </a:extLst>
+              </p:cNvPr>
+              <p:cNvSpPr>
+                <a:spLocks noGrp="1" noRot="1" noChangeAspect="1" noMove="1" noResize="1" noEditPoints="1" noAdjustHandles="1" noChangeArrowheads="1" noChangeShapeType="1" noTextEdit="1"/>
+              </p:cNvSpPr>
+              <p:nvPr>
+                <p:ph idx="1"/>
+              </p:nvPr>
+            </p:nvSpPr>
+            <p:spPr>
+              <a:blipFill>
+                <a:blip r:embed="rId2"/>
+                <a:stretch>
+                  <a:fillRect l="-571" t="-1440"/>
+                </a:stretch>
+              </a:blipFill>
+            </p:spPr>
+            <p:txBody>
+              <a:bodyPr/>
+              <a:lstStyle/>
+              <a:p>
+                <a:r>
+                  <a:rPr lang="en-GB">
+                    <a:noFill/>
+                  </a:rPr>
+                  <a:t> </a:t>
+                </a:r>
+              </a:p>
+            </p:txBody>
+          </p:sp>
+        </mc:Fallback>
+      </mc:AlternateContent>
+      <p:sp>
+        <p:nvSpPr>
+          <p:cNvPr id="4" name="Footer Placeholder 3">
+            <a:extLst>
+              <a:ext uri="{FF2B5EF4-FFF2-40B4-BE49-F238E27FC236}">
+                <a16:creationId xmlns:a16="http://schemas.microsoft.com/office/drawing/2014/main" id="{CD7AB38B-AC1D-4EA8-80B2-A46893D34343}"/>
+              </a:ext>
+            </a:extLst>
+          </p:cNvPr>
+          <p:cNvSpPr>
+            <a:spLocks noGrp="1"/>
+          </p:cNvSpPr>
+          <p:nvPr>
+            <p:ph type="ftr" sz="quarter" idx="11"/>
+          </p:nvPr>
+        </p:nvSpPr>
+        <p:spPr/>
+        <p:txBody>
+          <a:bodyPr/>
+          <a:lstStyle/>
+          <a:p>
+            <a:r>
+              <a:rPr lang="en-GB"/>
+              <a:t>Context-aware advertisement recommendation for high-speed social news feeding</a:t>
+            </a:r>
+            <a:endParaRPr lang="en-US" dirty="0"/>
+          </a:p>
+        </p:txBody>
+      </p:sp>
+      <p:sp>
+        <p:nvSpPr>
+          <p:cNvPr id="5" name="Date Placeholder 4">
+            <a:extLst>
+              <a:ext uri="{FF2B5EF4-FFF2-40B4-BE49-F238E27FC236}">
+                <a16:creationId xmlns:a16="http://schemas.microsoft.com/office/drawing/2014/main" id="{F1EA45F3-47A0-45E6-BE91-2733537B0438}"/>
+              </a:ext>
+            </a:extLst>
+          </p:cNvPr>
+          <p:cNvSpPr>
+            <a:spLocks noGrp="1"/>
+          </p:cNvSpPr>
+          <p:nvPr>
+            <p:ph type="dt" sz="half" idx="10"/>
+          </p:nvPr>
+        </p:nvSpPr>
+        <p:spPr/>
+        <p:txBody>
+          <a:bodyPr/>
+          <a:lstStyle/>
+          <a:p>
+            <a:r>
+              <a:rPr lang="en-CH"/>
+              <a:t>13/12/2017</a:t>
+            </a:r>
+            <a:endParaRPr lang="en-US" dirty="0"/>
+          </a:p>
+        </p:txBody>
+      </p:sp>
+      <p:sp>
+        <p:nvSpPr>
+          <p:cNvPr id="6" name="Slide Number Placeholder 5">
+            <a:extLst>
+              <a:ext uri="{FF2B5EF4-FFF2-40B4-BE49-F238E27FC236}">
+                <a16:creationId xmlns:a16="http://schemas.microsoft.com/office/drawing/2014/main" id="{A767AFAA-FF82-40EA-BA8B-206F5F008995}"/>
+              </a:ext>
+            </a:extLst>
+          </p:cNvPr>
+          <p:cNvSpPr>
+            <a:spLocks noGrp="1"/>
+          </p:cNvSpPr>
+          <p:nvPr>
+            <p:ph type="sldNum" sz="quarter" idx="12"/>
+          </p:nvPr>
+        </p:nvSpPr>
+        <p:spPr/>
+        <p:txBody>
+          <a:bodyPr/>
+          <a:lstStyle/>
+          <a:p>
+            <a:fld id="{E31375A4-56A4-47D6-9801-1991572033F7}" type="slidenum">
+              <a:rPr lang="en-US" smtClean="0"/>
+              <a:t>14</a:t>
+            </a:fld>
+            <a:endParaRPr lang="en-US" dirty="0"/>
+          </a:p>
+        </p:txBody>
+      </p:sp>
+    </p:spTree>
+    <p:extLst>
+      <p:ext uri="{BB962C8B-B14F-4D97-AF65-F5344CB8AC3E}">
+        <p14:creationId xmlns:p14="http://schemas.microsoft.com/office/powerpoint/2010/main" val="804328084"/>
       </p:ext>
     </p:extLst>
   </p:cSld>
@@ -11981,7 +13248,14 @@
                         <m:nor/>
                       </m:rPr>
                       <a:rPr lang="de-CH"/>
-                      <m:t>)=	</m:t>
+                      <m:t>)=</m:t>
+                    </m:r>
+                    <m:r>
+                      <m:rPr>
+                        <m:nor/>
+                      </m:rPr>
+                      <a:rPr lang="de-CH"/>
+                      <m:t>	</m:t>
                     </m:r>
                     <m:nary>
                       <m:naryPr>
@@ -12107,7 +13381,21 @@
                             <m:nor/>
                           </m:rPr>
                           <a:rPr lang="pl-PL"/>
-                          <m:t>)	 </m:t>
+                          <m:t>)</m:t>
+                        </m:r>
+                        <m:r>
+                          <m:rPr>
+                            <m:nor/>
+                          </m:rPr>
+                          <a:rPr lang="pl-PL"/>
+                          <m:t>	</m:t>
+                        </m:r>
+                        <m:r>
+                          <m:rPr>
+                            <m:nor/>
+                          </m:rPr>
+                          <a:rPr lang="pl-PL"/>
+                          <m:t> </m:t>
                         </m:r>
                       </m:e>
                     </m:nary>
@@ -12180,7 +13468,14 @@
                         <m:nor/>
                       </m:rPr>
                       <a:rPr lang="de-CH" sz="1600"/>
-                      <m:t>)	</m:t>
+                      <m:t>)</m:t>
+                    </m:r>
+                    <m:r>
+                      <m:rPr>
+                        <m:nor/>
+                      </m:rPr>
+                      <a:rPr lang="de-CH" sz="1600"/>
+                      <m:t>	</m:t>
                     </m:r>
                     <m:r>
                       <a:rPr lang="pt-BR" sz="1600" i="1" smtClean="0">
@@ -12252,7 +13547,14 @@
                             <m:nor/>
                           </m:rPr>
                           <a:rPr lang="de-CH" sz="1600"/>
-                          <m:t>	 </m:t>
+                          <m:t>	</m:t>
+                        </m:r>
+                        <m:r>
+                          <m:rPr>
+                            <m:nor/>
+                          </m:rPr>
+                          <a:rPr lang="de-CH" sz="1600"/>
+                          <m:t> </m:t>
                         </m:r>
                       </m:sub>
                       <m:sup/>

</xml_diff>

<commit_message>
make some changes but still summries some of the issues
</commit_message>
<xml_diff>
--- a/SeminarPresentation.pptx
+++ b/SeminarPresentation.pptx
@@ -11125,8 +11125,8 @@
           </a:p>
         </p:txBody>
       </p:sp>
-      <mc:AlternateContent xmlns:mc="http://schemas.openxmlformats.org/markup-compatibility/2006">
-        <mc:Choice xmlns:a14="http://schemas.microsoft.com/office/drawing/2010/main" Requires="a14">
+      <mc:AlternateContent xmlns:mc="http://schemas.openxmlformats.org/markup-compatibility/2006" xmlns:a14="http://schemas.microsoft.com/office/drawing/2010/main">
+        <mc:Choice Requires="a14">
           <p:sp>
             <p:nvSpPr>
               <p:cNvPr id="10" name="Content Placeholder 9">
@@ -11261,7 +11261,7 @@
             </p:txBody>
           </p:sp>
         </mc:Choice>
-        <mc:Fallback>
+        <mc:Fallback xmlns="">
           <p:sp>
             <p:nvSpPr>
               <p:cNvPr id="10" name="Content Placeholder 9">
@@ -11670,8 +11670,8 @@
           </a:p>
         </p:txBody>
       </p:sp>
-      <mc:AlternateContent xmlns:mc="http://schemas.openxmlformats.org/markup-compatibility/2006">
-        <mc:Choice xmlns:a14="http://schemas.microsoft.com/office/drawing/2010/main" Requires="a14">
+      <mc:AlternateContent xmlns:mc="http://schemas.openxmlformats.org/markup-compatibility/2006" xmlns:a14="http://schemas.microsoft.com/office/drawing/2010/main">
+        <mc:Choice Requires="a14">
           <p:sp>
             <p:nvSpPr>
               <p:cNvPr id="3" name="Content Placeholder 2">
@@ -12246,13 +12246,7 @@
                                   <a:rPr lang="de-CH" b="0" i="1" smtClean="0">
                                     <a:latin typeface="Cambria Math" panose="02040503050406030204" pitchFamily="18" charset="0"/>
                                   </a:rPr>
-                                  <m:t>1</m:t>
-                                </m:r>
-                                <m:r>
-                                  <a:rPr lang="de-CH" b="0" i="1" smtClean="0">
-                                    <a:latin typeface="Cambria Math" panose="02040503050406030204" pitchFamily="18" charset="0"/>
-                                  </a:rPr>
-                                  <m:t>−∝</m:t>
+                                  <m:t>1−∝</m:t>
                                 </m:r>
                               </m:num>
                               <m:den>
@@ -12391,14 +12385,7 @@
                                     <a:latin typeface="Cambria Math" panose="02040503050406030204" pitchFamily="18" charset="0"/>
                                     <a:ea typeface="Cambria Math" panose="02040503050406030204" pitchFamily="18" charset="0"/>
                                   </a:rPr>
-                                  <m:t>1</m:t>
-                                </m:r>
-                                <m:r>
-                                  <a:rPr lang="de-CH" b="0" i="1" smtClean="0">
-                                    <a:latin typeface="Cambria Math" panose="02040503050406030204" pitchFamily="18" charset="0"/>
-                                    <a:ea typeface="Cambria Math" panose="02040503050406030204" pitchFamily="18" charset="0"/>
-                                  </a:rPr>
-                                  <m:t>−∝</m:t>
+                                  <m:t>1−∝</m:t>
                                 </m:r>
                               </m:num>
                               <m:den>
@@ -12474,7 +12461,7 @@
             </p:txBody>
           </p:sp>
         </mc:Choice>
-        <mc:Fallback>
+        <mc:Fallback xmlns="">
           <p:sp>
             <p:nvSpPr>
               <p:cNvPr id="3" name="Content Placeholder 2">
@@ -12672,8 +12659,8 @@
           </a:p>
         </p:txBody>
       </p:sp>
-      <mc:AlternateContent xmlns:mc="http://schemas.openxmlformats.org/markup-compatibility/2006">
-        <mc:Choice xmlns:a14="http://schemas.microsoft.com/office/drawing/2010/main" Requires="a14">
+      <mc:AlternateContent xmlns:mc="http://schemas.openxmlformats.org/markup-compatibility/2006" xmlns:a14="http://schemas.microsoft.com/office/drawing/2010/main">
+        <mc:Choice Requires="a14">
           <p:sp>
             <p:nvSpPr>
               <p:cNvPr id="3" name="Content Placeholder 2">
@@ -13002,7 +12989,7 @@
             </p:txBody>
           </p:sp>
         </mc:Choice>
-        <mc:Fallback>
+        <mc:Fallback xmlns="">
           <p:sp>
             <p:nvSpPr>
               <p:cNvPr id="3" name="Content Placeholder 2">
@@ -14116,8 +14103,8 @@
           </a:p>
         </p:txBody>
       </p:sp>
-      <mc:AlternateContent xmlns:mc="http://schemas.openxmlformats.org/markup-compatibility/2006">
-        <mc:Choice xmlns:a14="http://schemas.microsoft.com/office/drawing/2010/main" Requires="a14">
+      <mc:AlternateContent xmlns:mc="http://schemas.openxmlformats.org/markup-compatibility/2006" xmlns:a14="http://schemas.microsoft.com/office/drawing/2010/main">
+        <mc:Choice Requires="a14">
           <p:sp>
             <p:nvSpPr>
               <p:cNvPr id="3" name="Content Placeholder 2"/>
@@ -14225,7 +14212,14 @@
                         <m:nor/>
                       </m:rPr>
                       <a:rPr lang="de-CH"/>
-                      <m:t>)=	</m:t>
+                      <m:t>)=</m:t>
+                    </m:r>
+                    <m:r>
+                      <m:rPr>
+                        <m:nor/>
+                      </m:rPr>
+                      <a:rPr lang="de-CH"/>
+                      <m:t>	</m:t>
                     </m:r>
                     <m:nary>
                       <m:naryPr>
@@ -14351,7 +14345,21 @@
                             <m:nor/>
                           </m:rPr>
                           <a:rPr lang="pl-PL"/>
-                          <m:t>)	 </m:t>
+                          <m:t>)</m:t>
+                        </m:r>
+                        <m:r>
+                          <m:rPr>
+                            <m:nor/>
+                          </m:rPr>
+                          <a:rPr lang="pl-PL"/>
+                          <m:t>	</m:t>
+                        </m:r>
+                        <m:r>
+                          <m:rPr>
+                            <m:nor/>
+                          </m:rPr>
+                          <a:rPr lang="pl-PL"/>
+                          <m:t> </m:t>
                         </m:r>
                       </m:e>
                     </m:nary>
@@ -14446,7 +14454,14 @@
                         <m:nor/>
                       </m:rPr>
                       <a:rPr lang="de-CH"/>
-                      <m:t>)	</m:t>
+                      <m:t>)</m:t>
+                    </m:r>
+                    <m:r>
+                      <m:rPr>
+                        <m:nor/>
+                      </m:rPr>
+                      <a:rPr lang="de-CH"/>
+                      <m:t>	</m:t>
                     </m:r>
                     <m:r>
                       <a:rPr lang="pt-BR" i="1" smtClean="0">
@@ -14518,7 +14533,14 @@
                             <m:nor/>
                           </m:rPr>
                           <a:rPr lang="de-CH"/>
-                          <m:t>	 </m:t>
+                          <m:t>	</m:t>
+                        </m:r>
+                        <m:r>
+                          <m:rPr>
+                            <m:nor/>
+                          </m:rPr>
+                          <a:rPr lang="de-CH"/>
+                          <m:t> </m:t>
                         </m:r>
                       </m:sub>
                       <m:sup/>
@@ -14684,7 +14706,7 @@
             </p:txBody>
           </p:sp>
         </mc:Choice>
-        <mc:Fallback>
+        <mc:Fallback xmlns="">
           <p:sp>
             <p:nvSpPr>
               <p:cNvPr id="3" name="Content Placeholder 2"/>
@@ -15536,14 +15558,7 @@
                                     <a:latin typeface="Cambria Math" panose="02040503050406030204" pitchFamily="18" charset="0"/>
                                     <a:ea typeface="Cambria Math" panose="02040503050406030204" pitchFamily="18" charset="0"/>
                                   </a:rPr>
-                                  <m:t>1</m:t>
-                                </m:r>
-                                <m:r>
-                                  <a:rPr lang="de-CH" b="0" i="1" smtClean="0">
-                                    <a:latin typeface="Cambria Math" panose="02040503050406030204" pitchFamily="18" charset="0"/>
-                                    <a:ea typeface="Cambria Math" panose="02040503050406030204" pitchFamily="18" charset="0"/>
-                                  </a:rPr>
-                                  <m:t>−</m:t>
+                                  <m:t>1−</m:t>
                                 </m:r>
                                 <m:r>
                                   <a:rPr lang="de-CH" b="0" i="1" smtClean="0">

</xml_diff>

<commit_message>
put the last modifications on the presntation
</commit_message>
<xml_diff>
--- a/SeminarPresentation.pptx
+++ b/SeminarPresentation.pptx
@@ -2470,7 +2470,7 @@
           <a:p>
             <a:fld id="{59041DB8-B66F-4DC8-A96E-33677E0F90FF}" type="datetimeFigureOut">
               <a:rPr lang="en-US" smtClean="0"/>
-              <a:t>12/9/2017</a:t>
+              <a:t>12/10/2017</a:t>
             </a:fld>
             <a:endParaRPr lang="en-US" dirty="0"/>
           </a:p>
@@ -2635,7 +2635,7 @@
           <a:p>
             <a:fld id="{DEB49C4A-65AC-492D-9701-81B46C3AD0E4}" type="datetimeFigureOut">
               <a:rPr lang="en-US" smtClean="0"/>
-              <a:t>12/9/2017</a:t>
+              <a:t>12/10/2017</a:t>
             </a:fld>
             <a:endParaRPr lang="en-US" dirty="0"/>
           </a:p>
@@ -10565,8 +10565,8 @@
               <a:buAutoNum type="arabicPeriod"/>
             </a:pPr>
             <a:r>
-              <a:rPr lang="en-GB" sz="1800" dirty="0"/>
-              <a:t>Let the window size m = 3, the weighting parameter α = 0.25 and the number of topics |T| = 2. </a:t>
+              <a:rPr lang="en-GB" dirty="0"/>
+              <a:t>m = 3, α = 0.25,|T| = 2. </a:t>
             </a:r>
           </a:p>
           <a:p>
@@ -10581,8 +10581,16 @@
               <a:buAutoNum type="arabicPeriod"/>
             </a:pPr>
             <a:r>
-              <a:rPr lang="en-GB" sz="1800" dirty="0"/>
-              <a:t>Given a user u, let Hu = (0.4, 0.6) be the topic distributions of his static interests. </a:t>
+              <a:rPr lang="en-GB" dirty="0"/>
+              <a:t>let H</a:t>
+            </a:r>
+            <a:r>
+              <a:rPr lang="en-GB" baseline="-25000" dirty="0"/>
+              <a:t>u</a:t>
+            </a:r>
+            <a:r>
+              <a:rPr lang="en-GB" dirty="0"/>
+              <a:t> = (0.4, 0.6)  static interests </a:t>
             </a:r>
           </a:p>
           <a:p>
@@ -10597,8 +10605,8 @@
               <a:buAutoNum type="arabicPeriod"/>
             </a:pPr>
             <a:r>
-              <a:rPr lang="en-GB" sz="1800" dirty="0"/>
-              <a:t>Topic distributions of the 3 posts in the window are (0.2, 0.8), (0.1, 0.9) and (1.0, 0).</a:t>
+              <a:rPr lang="en-GB" dirty="0"/>
+              <a:t>(0.2, 0.8), (0.1, 0.9) and (1.0, 0) topic distribution</a:t>
             </a:r>
           </a:p>
           <a:p>
@@ -10613,8 +10621,16 @@
               <a:buAutoNum type="arabicPeriod"/>
             </a:pPr>
             <a:r>
-              <a:rPr lang="en-GB" sz="1800" dirty="0"/>
-              <a:t>When u triggers a read operation, Qu is calculated as Qu = (0.425, 0.575). </a:t>
+              <a:rPr lang="en-GB" dirty="0"/>
+              <a:t>Q</a:t>
+            </a:r>
+            <a:r>
+              <a:rPr lang="en-GB" baseline="-25000" dirty="0"/>
+              <a:t>u</a:t>
+            </a:r>
+            <a:r>
+              <a:rPr lang="en-GB" dirty="0"/>
+              <a:t> = (0.425, 0.575). </a:t>
             </a:r>
           </a:p>
           <a:p>
@@ -10629,8 +10645,8 @@
               <a:buAutoNum type="arabicPeriod"/>
             </a:pPr>
             <a:r>
-              <a:rPr lang="en-GB" sz="1800" dirty="0"/>
-              <a:t>Qu is used to query an ad database with four tuples {a1 = (0.3, 0.9), a2 = (0.4, 0.7), a3 = (0.5, 0.8) and a4 = (1.0, 0)}. </a:t>
+              <a:rPr lang="en-GB" dirty="0"/>
+              <a:t>{a1 = (0.3, 0.9), a2 = (0.4, 0.7), a3 = (0.5, 0.8) and a4 = (1.0, 0)} </a:t>
             </a:r>
           </a:p>
           <a:p>
@@ -10645,8 +10661,8 @@
               <a:buAutoNum type="arabicPeriod"/>
             </a:pPr>
             <a:r>
-              <a:rPr lang="en-GB" sz="1800" dirty="0"/>
-              <a:t>We pre-compute two inverted lists lw1 and lw2 for the topics and get lw1 = {(a4, 1.0), (a3, 0.5), (a2, 0.4), (a1, 0.3)} and lw2 = {(a1, 0.9), (a3, 0.8), (a2, 0.7), (a1, 0.0)}. </a:t>
+              <a:rPr lang="en-GB" dirty="0"/>
+              <a:t>lw1 and lw2 for the topics and get lw1 = {(a4, 1.0), (a3, 0.5), (a2, 0.4), (a1, 0.3)} and lw2 = {(a1, 0.9), (a3, 0.8), (a2, 0.7), (a1, 0.0)} </a:t>
             </a:r>
           </a:p>
           <a:p>
@@ -10661,10 +10677,10 @@
               <a:buAutoNum type="arabicPeriod"/>
             </a:pPr>
             <a:r>
-              <a:rPr lang="en-GB" sz="1800" dirty="0"/>
-              <a:t>By calling the TA algorithm presented above, a3 will be returned as the most relevant ad if k is set to 1. </a:t>
-            </a:r>
-            <a:endParaRPr lang="en-CH" sz="1800" dirty="0"/>
+              <a:rPr lang="en-GB" dirty="0"/>
+              <a:t>By calling the TA algorithm, a3 will be returned as the most relevant ad if k is set to 1 </a:t>
+            </a:r>
+            <a:endParaRPr lang="en-CH" dirty="0"/>
           </a:p>
         </p:txBody>
       </p:sp>
@@ -11125,8 +11141,8 @@
           </a:p>
         </p:txBody>
       </p:sp>
-      <mc:AlternateContent xmlns:mc="http://schemas.openxmlformats.org/markup-compatibility/2006" xmlns:a14="http://schemas.microsoft.com/office/drawing/2010/main">
-        <mc:Choice Requires="a14">
+      <mc:AlternateContent xmlns:mc="http://schemas.openxmlformats.org/markup-compatibility/2006">
+        <mc:Choice xmlns:a14="http://schemas.microsoft.com/office/drawing/2010/main" Requires="a14">
           <p:sp>
             <p:nvSpPr>
               <p:cNvPr id="10" name="Content Placeholder 9">
@@ -11154,58 +11170,105 @@
                   <a:buNone/>
                 </a:pPr>
                 <a:r>
-                  <a:rPr lang="en-GB" sz="2400" dirty="0"/>
+                  <a:rPr lang="en-GB" dirty="0"/>
                   <a:t>Summary of the GSR algorithm</a:t>
                 </a:r>
               </a:p>
               <a:p>
+                <a:pPr marL="457200" indent="-457200">
+                  <a:spcBef>
+                    <a:spcPts val="1200"/>
+                  </a:spcBef>
+                  <a:spcAft>
+                    <a:spcPts val="1200"/>
+                  </a:spcAft>
+                  <a:buFont typeface="+mj-lt"/>
+                  <a:buAutoNum type="arabicPeriod"/>
+                </a:pPr>
                 <a:r>
-                  <a:rPr lang="en-GB" sz="1600" dirty="0"/>
-                  <a:t>After calculate the top-k using online algorithm, we store it in R.</a:t>
+                  <a:rPr lang="en-GB" dirty="0"/>
+                  <a:t>Calculate the top-k, store it in R.</a:t>
                 </a:r>
               </a:p>
               <a:p>
+                <a:pPr marL="457200" indent="-457200">
+                  <a:spcBef>
+                    <a:spcPts val="1200"/>
+                  </a:spcBef>
+                  <a:spcAft>
+                    <a:spcPts val="1200"/>
+                  </a:spcAft>
+                  <a:buFont typeface="+mj-lt"/>
+                  <a:buAutoNum type="arabicPeriod"/>
+                </a:pPr>
                 <a:r>
-                  <a:rPr lang="en-GB" sz="1600" dirty="0"/>
+                  <a:rPr lang="en-GB" dirty="0"/>
                   <a:t>Pick up the most promising topics/dimensions.</a:t>
                 </a:r>
               </a:p>
               <a:p>
+                <a:pPr marL="457200" indent="-457200">
+                  <a:spcBef>
+                    <a:spcPts val="1200"/>
+                  </a:spcBef>
+                  <a:spcAft>
+                    <a:spcPts val="1200"/>
+                  </a:spcAft>
+                  <a:buFont typeface="+mj-lt"/>
+                  <a:buAutoNum type="arabicPeriod"/>
+                </a:pPr>
                 <a:r>
-                  <a:rPr lang="en-GB" sz="1600" dirty="0"/>
-                  <a:t>For each dimension we calculate the distance between the query vector and the safe region boundaries.</a:t>
+                  <a:rPr lang="en-GB" dirty="0"/>
+                  <a:t>Calculate the distance between the query vector and the safe region boundaries.</a:t>
                 </a:r>
               </a:p>
               <a:p>
+                <a:pPr marL="457200" indent="-457200">
+                  <a:spcBef>
+                    <a:spcPts val="1200"/>
+                  </a:spcBef>
+                  <a:spcAft>
+                    <a:spcPts val="1200"/>
+                  </a:spcAft>
+                  <a:buFont typeface="+mj-lt"/>
+                  <a:buAutoNum type="arabicPeriod"/>
+                </a:pPr>
                 <a:r>
-                  <a:rPr lang="en-GB" sz="1600" dirty="0"/>
-                  <a:t>select the dimension with the minimum distance to expand the safe region.</a:t>
+                  <a:rPr lang="en-GB" dirty="0"/>
+                  <a:t>Select the dimension with the minimum distance. </a:t>
                 </a:r>
               </a:p>
               <a:p>
+                <a:pPr marL="457200" indent="-457200">
+                  <a:spcAft>
+                    <a:spcPts val="1200"/>
+                  </a:spcAft>
+                  <a:buFont typeface="+mj-lt"/>
+                  <a:buAutoNum type="arabicPeriod"/>
+                </a:pPr>
                 <a:r>
-                  <a:rPr lang="en-GB" sz="1600" dirty="0"/>
-                  <a:t>For the selected dimension we check whether it is safe to expand to expand upwards and downwards by an expansion unit </a:t>
+                  <a:rPr lang="en-GB" dirty="0"/>
+                  <a:t>Check whether it is safe to expand upwards and downwards by an expansion unit </a:t>
                 </a:r>
                 <a14:m>
                   <m:oMath xmlns:m="http://schemas.openxmlformats.org/officeDocument/2006/math">
                     <m:f>
                       <m:fPr>
                         <m:ctrlPr>
-                          <a:rPr lang="en-GB" sz="1600" i="1" smtClean="0">
+                          <a:rPr lang="en-GB" i="1" smtClean="0">
                             <a:latin typeface="Cambria Math" panose="02040503050406030204" pitchFamily="18" charset="0"/>
                           </a:rPr>
                         </m:ctrlPr>
                       </m:fPr>
                       <m:num>
                         <m:r>
-                          <a:rPr lang="de-CH" sz="1600" b="0" i="1" smtClean="0">
+                          <a:rPr lang="de-CH" b="0" i="1" smtClean="0">
                             <a:latin typeface="Cambria Math" panose="02040503050406030204" pitchFamily="18" charset="0"/>
                           </a:rPr>
                           <m:t>1</m:t>
                         </m:r>
                         <m:r>
-                          <a:rPr lang="de-CH" sz="1600" b="0" i="1" smtClean="0">
+                          <a:rPr lang="de-CH" b="0" i="1" smtClean="0">
                             <a:latin typeface="Cambria Math" panose="02040503050406030204" pitchFamily="18" charset="0"/>
                           </a:rPr>
                           <m:t>−∝</m:t>
@@ -11213,7 +11276,7 @@
                       </m:num>
                       <m:den>
                         <m:r>
-                          <a:rPr lang="de-CH" sz="1600" b="0" i="1" smtClean="0">
+                          <a:rPr lang="de-CH" b="0" i="1" smtClean="0">
                             <a:latin typeface="Cambria Math" panose="02040503050406030204" pitchFamily="18" charset="0"/>
                           </a:rPr>
                           <m:t>𝑚</m:t>
@@ -11223,45 +11286,39 @@
                   </m:oMath>
                 </a14:m>
                 <a:r>
-                  <a:rPr lang="en-GB" sz="1600" dirty="0"/>
-                  <a:t> (the maximum possible change for Q</a:t>
-                </a:r>
-                <a:r>
-                  <a:rPr lang="en-GB" sz="1600" baseline="-25000" dirty="0"/>
-                  <a:t>u</a:t>
-                </a:r>
-                <a:r>
-                  <a:rPr lang="en-GB" sz="1600" dirty="0"/>
-                  <a:t>(w)).</a:t>
+                  <a:rPr lang="en-GB" dirty="0"/>
+                  <a:t>.</a:t>
                 </a:r>
               </a:p>
               <a:p>
+                <a:pPr marL="457200" indent="-457200">
+                  <a:spcBef>
+                    <a:spcPts val="1200"/>
+                  </a:spcBef>
+                  <a:spcAft>
+                    <a:spcPts val="1200"/>
+                  </a:spcAft>
+                  <a:buFont typeface="+mj-lt"/>
+                  <a:buAutoNum type="arabicPeriod"/>
+                </a:pPr>
                 <a:r>
-                  <a:rPr lang="en-GB" sz="1600" dirty="0"/>
-                  <a:t>If its minimum relevance to the current top-k ads, denoted by Sl, is still larger than the maximum relevance to those not in R, denoted by Su. Then the expansion is safe.</a:t>
+                  <a:rPr lang="en-GB" dirty="0"/>
+                  <a:t>If SI &gt; Su then the expansion is safe. Otherwise,  algorithm terminates and returns the safe region expanded in partial dimensions.</a:t>
                 </a:r>
               </a:p>
               <a:p>
-                <a:r>
-                  <a:rPr lang="en-GB" sz="1600" dirty="0"/>
-                  <a:t>algorithm terminates and returns the safe region expanded in partial dimensions</a:t>
-                </a:r>
-                <a:r>
-                  <a:rPr lang="en-GB" dirty="0"/>
-                  <a:t>.</a:t>
-                </a:r>
-                <a:endParaRPr lang="en-GB" sz="1600" dirty="0"/>
+                <a:pPr marL="0" indent="0">
+                  <a:buNone/>
+                </a:pPr>
+                <a:endParaRPr lang="en-GB" dirty="0"/>
               </a:p>
               <a:p>
-                <a:endParaRPr lang="en-GB" sz="1600" dirty="0"/>
-              </a:p>
-              <a:p>
-                <a:endParaRPr lang="en-GB" sz="1600" dirty="0"/>
+                <a:endParaRPr lang="en-GB" dirty="0"/>
               </a:p>
             </p:txBody>
           </p:sp>
         </mc:Choice>
-        <mc:Fallback xmlns="">
+        <mc:Fallback>
           <p:sp>
             <p:nvSpPr>
               <p:cNvPr id="10" name="Content Placeholder 9">
@@ -11282,7 +11339,7 @@
               <a:blipFill>
                 <a:blip r:embed="rId2"/>
                 <a:stretch>
-                  <a:fillRect l="-1471" t="-1387" r="-784"/>
+                  <a:fillRect l="-980" t="-1067" r="-784"/>
                 </a:stretch>
               </a:blipFill>
             </p:spPr>
@@ -11565,7 +11622,7 @@
             </a:r>
             <a:r>
               <a:rPr lang="en-GB" sz="2000" dirty="0"/>
-              <a:t>to obtain top-k ads on the fly and construct a new safe region in the meanwhile, expensive </a:t>
+              <a:t>and construct a new safe region, expensive.</a:t>
             </a:r>
           </a:p>
           <a:p>
@@ -11581,11 +11638,35 @@
             </a:pPr>
             <a:r>
               <a:rPr lang="en-GB" dirty="0"/>
-              <a:t>When Qu moves out of the safe region, we can search all the safe regions of other users. If we can find a safe region from user v that contains the new query vector Qu of user u, its top-k ads are exactly the same as user u.</a:t>
-            </a:r>
-          </a:p>
-          <a:p>
-            <a:pPr>
+              <a:t>When Q</a:t>
+            </a:r>
+            <a:r>
+              <a:rPr lang="en-GB" baseline="-25000" dirty="0"/>
+              <a:t>u</a:t>
+            </a:r>
+            <a:r>
+              <a:rPr lang="en-GB" dirty="0"/>
+              <a:t> moves out of the safe region,</a:t>
+            </a:r>
+          </a:p>
+          <a:p>
+            <a:pPr lvl="1">
+              <a:lnSpc>
+                <a:spcPct val="150000"/>
+              </a:lnSpc>
+              <a:spcBef>
+                <a:spcPts val="0"/>
+              </a:spcBef>
+              <a:buFont typeface="Wingdings" panose="05000000000000000000" pitchFamily="2" charset="2"/>
+              <a:buChar char="§"/>
+            </a:pPr>
+            <a:r>
+              <a:rPr lang="en-GB" dirty="0"/>
+              <a:t>search all the safe regions of other users. If we can find a safe region from user v that contains the new query vector Qu of user u, its top-k ads are exactly the same as user u.</a:t>
+            </a:r>
+          </a:p>
+          <a:p>
+            <a:pPr lvl="1">
               <a:lnSpc>
                 <a:spcPct val="150000"/>
               </a:lnSpc>
@@ -11597,6 +11678,35 @@
               <a:rPr lang="en-GB" dirty="0"/>
               <a:t>Moreover, we can assign the safe region of v directly to user u. In this way, the cost of online retrieval and safe region computation can be saved.</a:t>
             </a:r>
+          </a:p>
+        </p:txBody>
+      </p:sp>
+      <p:sp>
+        <p:nvSpPr>
+          <p:cNvPr id="4" name="Slide Number Placeholder 3">
+            <a:extLst>
+              <a:ext uri="{FF2B5EF4-FFF2-40B4-BE49-F238E27FC236}">
+                <a16:creationId xmlns:a16="http://schemas.microsoft.com/office/drawing/2014/main" id="{31AA32A2-5010-4422-8C55-8691614D13A5}"/>
+              </a:ext>
+            </a:extLst>
+          </p:cNvPr>
+          <p:cNvSpPr>
+            <a:spLocks noGrp="1"/>
+          </p:cNvSpPr>
+          <p:nvPr>
+            <p:ph type="sldNum" sz="quarter" idx="12"/>
+          </p:nvPr>
+        </p:nvSpPr>
+        <p:spPr/>
+        <p:txBody>
+          <a:bodyPr/>
+          <a:lstStyle/>
+          <a:p>
+            <a:fld id="{E31375A4-56A4-47D6-9801-1991572033F7}" type="slidenum">
+              <a:rPr lang="en-US" smtClean="0"/>
+              <a:t>13</a:t>
+            </a:fld>
+            <a:endParaRPr lang="en-US" dirty="0"/>
           </a:p>
         </p:txBody>
       </p:sp>
@@ -11670,8 +11780,8 @@
           </a:p>
         </p:txBody>
       </p:sp>
-      <mc:AlternateContent xmlns:mc="http://schemas.openxmlformats.org/markup-compatibility/2006" xmlns:a14="http://schemas.microsoft.com/office/drawing/2010/main">
-        <mc:Choice Requires="a14">
+      <mc:AlternateContent xmlns:mc="http://schemas.openxmlformats.org/markup-compatibility/2006">
+        <mc:Choice xmlns:a14="http://schemas.microsoft.com/office/drawing/2010/main" Requires="a14">
           <p:sp>
             <p:nvSpPr>
               <p:cNvPr id="3" name="Content Placeholder 2">
@@ -11697,7 +11807,7 @@
               <a:p>
                 <a:r>
                   <a:rPr lang="en-GB" dirty="0"/>
-                  <a:t>Combining the metrices of the online retrieval algorithm and GSR</a:t>
+                  <a:t>Combine the metrices of the online retrieval algorithm and GSR</a:t>
                 </a:r>
               </a:p>
               <a:p>
@@ -12246,7 +12356,13 @@
                                   <a:rPr lang="de-CH" b="0" i="1" smtClean="0">
                                     <a:latin typeface="Cambria Math" panose="02040503050406030204" pitchFamily="18" charset="0"/>
                                   </a:rPr>
-                                  <m:t>1−∝</m:t>
+                                  <m:t>1</m:t>
+                                </m:r>
+                                <m:r>
+                                  <a:rPr lang="de-CH" b="0" i="1" smtClean="0">
+                                    <a:latin typeface="Cambria Math" panose="02040503050406030204" pitchFamily="18" charset="0"/>
+                                  </a:rPr>
+                                  <m:t>−∝</m:t>
                                 </m:r>
                               </m:num>
                               <m:den>
@@ -12385,7 +12501,14 @@
                                     <a:latin typeface="Cambria Math" panose="02040503050406030204" pitchFamily="18" charset="0"/>
                                     <a:ea typeface="Cambria Math" panose="02040503050406030204" pitchFamily="18" charset="0"/>
                                   </a:rPr>
-                                  <m:t>1−∝</m:t>
+                                  <m:t>1</m:t>
+                                </m:r>
+                                <m:r>
+                                  <a:rPr lang="de-CH" b="0" i="1" smtClean="0">
+                                    <a:latin typeface="Cambria Math" panose="02040503050406030204" pitchFamily="18" charset="0"/>
+                                    <a:ea typeface="Cambria Math" panose="02040503050406030204" pitchFamily="18" charset="0"/>
+                                  </a:rPr>
+                                  <m:t>−∝</m:t>
                                 </m:r>
                               </m:num>
                               <m:den>
@@ -12461,7 +12584,7 @@
             </p:txBody>
           </p:sp>
         </mc:Choice>
-        <mc:Fallback xmlns="">
+        <mc:Fallback>
           <p:sp>
             <p:nvSpPr>
               <p:cNvPr id="3" name="Content Placeholder 2">
@@ -12659,8 +12782,8 @@
           </a:p>
         </p:txBody>
       </p:sp>
-      <mc:AlternateContent xmlns:mc="http://schemas.openxmlformats.org/markup-compatibility/2006" xmlns:a14="http://schemas.microsoft.com/office/drawing/2010/main">
-        <mc:Choice Requires="a14">
+      <mc:AlternateContent xmlns:mc="http://schemas.openxmlformats.org/markup-compatibility/2006">
+        <mc:Choice xmlns:a14="http://schemas.microsoft.com/office/drawing/2010/main" Requires="a14">
           <p:sp>
             <p:nvSpPr>
               <p:cNvPr id="3" name="Content Placeholder 2">
@@ -12684,13 +12807,14 @@
               </a:bodyPr>
               <a:lstStyle/>
               <a:p>
-                <a:pPr>
+                <a:pPr marL="0" indent="0">
                   <a:lnSpc>
                     <a:spcPct val="150000"/>
                   </a:lnSpc>
                   <a:spcBef>
                     <a:spcPts val="0"/>
                   </a:spcBef>
+                  <a:buNone/>
                 </a:pPr>
                 <a:r>
                   <a:rPr lang="en-GB" dirty="0"/>
@@ -12698,7 +12822,7 @@
                 </a:r>
               </a:p>
               <a:p>
-                <a:pPr>
+                <a:pPr lvl="1">
                   <a:lnSpc>
                     <a:spcPct val="150000"/>
                   </a:lnSpc>
@@ -12989,7 +13113,7 @@
             </p:txBody>
           </p:sp>
         </mc:Choice>
-        <mc:Fallback xmlns="">
+        <mc:Fallback>
           <p:sp>
             <p:nvSpPr>
               <p:cNvPr id="3" name="Content Placeholder 2">
@@ -13010,7 +13134,7 @@
               <a:blipFill>
                 <a:blip r:embed="rId2"/>
                 <a:stretch>
-                  <a:fillRect l="-571" r="-825" b="-8320"/>
+                  <a:fillRect l="-698" r="-1333" b="-6080"/>
                 </a:stretch>
               </a:blipFill>
             </p:spPr>
@@ -13214,7 +13338,7 @@
             </a:pPr>
             <a:r>
               <a:rPr lang="en-GB" dirty="0"/>
-              <a:t>As we have seen the hybrid model has combined, the metrices of both GSR and the online, as well as provide a mechanism to choose the proper one, when the user asks for his news feed.</a:t>
+              <a:t>the hybrid model has combined, the metrices of both GSR and the online, as well as provide a mechanism to choose the proper one, when the user asks for his news feed</a:t>
             </a:r>
           </a:p>
           <a:p>
@@ -13225,7 +13349,7 @@
             </a:pPr>
             <a:r>
               <a:rPr lang="en-GB" dirty="0"/>
-              <a:t>As we have seen before it out performs both of the two algorithms.</a:t>
+              <a:t>As we have seen before it out performs both of the two algorithms</a:t>
             </a:r>
           </a:p>
           <a:p>
@@ -13236,7 +13360,7 @@
             </a:pPr>
             <a:r>
               <a:rPr lang="en-GB" dirty="0"/>
-              <a:t>According to many experiments on huge datasets, the hybrid model has proved to be efficient and robust. </a:t>
+              <a:t>According to many experiments on huge datasets, the hybrid model has proved to be efficient and robust </a:t>
             </a:r>
           </a:p>
         </p:txBody>
@@ -13684,7 +13808,7 @@
           <a:p>
             <a:r>
               <a:rPr lang="en-GB" dirty="0"/>
-              <a:t>the National University of Singapore.</a:t>
+              <a:t>the National University of Singapore introduced</a:t>
             </a:r>
           </a:p>
           <a:p>
@@ -15148,12 +15272,16 @@
           </a:bodyPr>
           <a:lstStyle/>
           <a:p>
+            <a:pPr marL="0" indent="0">
+              <a:buNone/>
+            </a:pPr>
             <a:r>
               <a:rPr lang="de-CH" dirty="0"/>
               <a:t>The total relevance between a user u and an ad a is given by the following equation which combains the user static interests and dynamic news feed from his friends.</a:t>
             </a:r>
           </a:p>
           <a:p>
+            <a:pPr lvl="1"/>
             <a:r>
               <a:rPr lang="el-GR" dirty="0"/>
               <a:t>φ(</a:t>
@@ -15188,9 +15316,12 @@
             </a:r>
           </a:p>
           <a:p>
+            <a:pPr marL="0" indent="0">
+              <a:buNone/>
+            </a:pPr>
             <a:r>
               <a:rPr lang="de-CH" dirty="0"/>
-              <a:t>Where </a:t>
+              <a:t> Where </a:t>
             </a:r>
             <a:r>
               <a:rPr lang="el-GR" dirty="0"/>
@@ -15235,6 +15366,35 @@
               <a:t>Dynamic, real time, efficient.</a:t>
             </a:r>
             <a:endParaRPr lang="en-CH" dirty="0"/>
+          </a:p>
+        </p:txBody>
+      </p:sp>
+      <p:sp>
+        <p:nvSpPr>
+          <p:cNvPr id="3" name="Slide Number Placeholder 2">
+            <a:extLst>
+              <a:ext uri="{FF2B5EF4-FFF2-40B4-BE49-F238E27FC236}">
+                <a16:creationId xmlns:a16="http://schemas.microsoft.com/office/drawing/2014/main" id="{2848A7E8-ED58-4904-9FB0-DABFFD08523F}"/>
+              </a:ext>
+            </a:extLst>
+          </p:cNvPr>
+          <p:cNvSpPr>
+            <a:spLocks noGrp="1"/>
+          </p:cNvSpPr>
+          <p:nvPr>
+            <p:ph type="sldNum" sz="quarter" idx="12"/>
+          </p:nvPr>
+        </p:nvSpPr>
+        <p:spPr/>
+        <p:txBody>
+          <a:bodyPr/>
+          <a:lstStyle/>
+          <a:p>
+            <a:fld id="{E31375A4-56A4-47D6-9801-1991572033F7}" type="slidenum">
+              <a:rPr lang="en-US" smtClean="0"/>
+              <a:t>7</a:t>
+            </a:fld>
+            <a:endParaRPr lang="en-US" dirty="0"/>
           </a:p>
         </p:txBody>
       </p:sp>
@@ -15305,8 +15465,8 @@
           </a:p>
         </p:txBody>
       </p:sp>
-      <mc:AlternateContent xmlns:mc="http://schemas.openxmlformats.org/markup-compatibility/2006" xmlns:a14="http://schemas.microsoft.com/office/drawing/2010/main">
-        <mc:Choice Requires="a14">
+      <mc:AlternateContent xmlns:mc="http://schemas.openxmlformats.org/markup-compatibility/2006">
+        <mc:Choice xmlns:a14="http://schemas.microsoft.com/office/drawing/2010/main" Requires="a14">
           <p:sp>
             <p:nvSpPr>
               <p:cNvPr id="10" name="Content Placeholder 9">
@@ -15348,20 +15508,20 @@
                 <a:pPr lvl="1"/>
                 <a:r>
                   <a:rPr lang="de-CH" dirty="0"/>
-                  <a:t>Static model, Offilne computed, returns with the user news feed. </a:t>
+                  <a:t>Static model, Offilne computed, returns with the user news feed</a:t>
                 </a:r>
               </a:p>
               <a:p>
                 <a:r>
                   <a:rPr lang="de-CH" dirty="0"/>
-                  <a:t>These models don’t work in the  context aware </a:t>
+                  <a:t>These models don’t work in the context aware </a:t>
                 </a:r>
               </a:p>
               <a:p>
                 <a:pPr lvl="1"/>
                 <a:r>
                   <a:rPr lang="de-CH" dirty="0"/>
-                  <a:t>Dynamaic context, write operations, news feed variations.</a:t>
+                  <a:t>Dynamaic context, write operations, news feed variations</a:t>
                 </a:r>
               </a:p>
               <a:p>
@@ -15374,7 +15534,7 @@
                 <a:pPr lvl="1"/>
                 <a:r>
                   <a:rPr lang="de-CH" dirty="0"/>
-                  <a:t>Scan all ads database without prober index, very high cost. </a:t>
+                  <a:t>Scan all ads database without prober index, very high cost </a:t>
                 </a:r>
               </a:p>
               <a:p>
@@ -15558,7 +15718,14 @@
                                     <a:latin typeface="Cambria Math" panose="02040503050406030204" pitchFamily="18" charset="0"/>
                                     <a:ea typeface="Cambria Math" panose="02040503050406030204" pitchFamily="18" charset="0"/>
                                   </a:rPr>
-                                  <m:t>1−</m:t>
+                                  <m:t>1</m:t>
+                                </m:r>
+                                <m:r>
+                                  <a:rPr lang="de-CH" b="0" i="1" smtClean="0">
+                                    <a:latin typeface="Cambria Math" panose="02040503050406030204" pitchFamily="18" charset="0"/>
+                                    <a:ea typeface="Cambria Math" panose="02040503050406030204" pitchFamily="18" charset="0"/>
+                                  </a:rPr>
+                                  <m:t>−</m:t>
                                 </m:r>
                                 <m:r>
                                   <a:rPr lang="de-CH" b="0" i="1" smtClean="0">
@@ -15712,7 +15879,7 @@
             </p:txBody>
           </p:sp>
         </mc:Choice>
-        <mc:Fallback xmlns="">
+        <mc:Fallback>
           <p:sp>
             <p:nvSpPr>
               <p:cNvPr id="10" name="Content Placeholder 9">
@@ -16020,6 +16187,9 @@
           </a:bodyPr>
           <a:lstStyle/>
           <a:p>
+            <a:pPr marL="0" indent="0">
+              <a:buNone/>
+            </a:pPr>
             <a:r>
               <a:rPr lang="en-GB" dirty="0"/>
               <a:t>After rewriting the ranking function in aggregation way we can simplify the online </a:t>
@@ -16079,7 +16249,7 @@
             </a:pPr>
             <a:r>
               <a:rPr lang="de-CH" dirty="0"/>
-              <a:t>Appliny the threshold algorithm.</a:t>
+              <a:t>Appling the threshold algorithm</a:t>
             </a:r>
             <a:endParaRPr lang="en-GB" dirty="0"/>
           </a:p>

</xml_diff>